<commit_message>
bunch of junk. mostly start of using plotly
</commit_message>
<xml_diff>
--- a/template/ppt_template_v01.pptx
+++ b/template/ppt_template_v01.pptx
@@ -4,13 +4,6 @@
   <p:sldMasterIdLst>
     <p:sldMasterId id="2147483660" r:id="rId1"/>
   </p:sldMasterIdLst>
-  <p:sldIdLst>
-    <p:sldId id="264" r:id="rId2"/>
-    <p:sldId id="260" r:id="rId3"/>
-    <p:sldId id="262" r:id="rId4"/>
-    <p:sldId id="263" r:id="rId5"/>
-    <p:sldId id="259" r:id="rId6"/>
-  </p:sldIdLst>
   <p:sldSz cx="7315200" cy="9601200"/>
   <p:notesSz cx="6858000" cy="9144000"/>
   <p:defaultTextStyle>
@@ -727,7 +720,7 @@
             <a:fld id="{8132FBAA-DA07-474B-8276-AE4D1C7A86A9}" type="datetime1">
               <a:rPr lang="en-US" smtClean="0"/>
               <a:pPr/>
-              <a:t>9/13/2020</a:t>
+              <a:t>11/11/2020</a:t>
             </a:fld>
             <a:endParaRPr lang="en-US" dirty="0"/>
           </a:p>
@@ -1037,7 +1030,7 @@
         <p:spPr>
           <a:xfrm>
             <a:off x="237698" y="2863502"/>
-            <a:ext cx="2439295" cy="1188018"/>
+            <a:ext cx="2439295" cy="1292662"/>
           </a:xfrm>
           <a:prstGeom prst="rect">
             <a:avLst/>
@@ -1050,7 +1043,7 @@
           </a:bodyPr>
           <a:lstStyle/>
           <a:p>
-            <a:pPr marL="0" marR="0" lvl="0" indent="0" algn="just" defTabSz="731520" rtl="0" eaLnBrk="1" fontAlgn="auto" latinLnBrk="0" hangingPunct="1">
+            <a:pPr marL="0" marR="0" lvl="0" indent="0" algn="l" defTabSz="731520" rtl="0" eaLnBrk="1" fontAlgn="auto" latinLnBrk="0" hangingPunct="1">
               <a:lnSpc>
                 <a:spcPct val="90000"/>
               </a:lnSpc>
@@ -1082,11 +1075,11 @@
                 <a:ea typeface="+mn-ea"/>
                 <a:cs typeface="+mn-cs"/>
               </a:rPr>
-              <a:t>First Last</a:t>
-            </a:r>
-          </a:p>
-          <a:p>
-            <a:pPr marL="0" marR="0" lvl="0" indent="0" algn="just" defTabSz="731520" rtl="0" eaLnBrk="1" fontAlgn="auto" latinLnBrk="0" hangingPunct="1">
+              <a:t>Walter Strickland</a:t>
+            </a:r>
+          </a:p>
+          <a:p>
+            <a:pPr marL="0" marR="0" lvl="0" indent="0" algn="l" defTabSz="731520" rtl="0" eaLnBrk="1" fontAlgn="auto" latinLnBrk="0" hangingPunct="1">
               <a:lnSpc>
                 <a:spcPct val="90000"/>
               </a:lnSpc>
@@ -1118,17 +1111,18 @@
                 <a:ea typeface="+mn-ea"/>
                 <a:cs typeface="+mn-cs"/>
               </a:rPr>
-              <a:t>Title</a:t>
-            </a:r>
-          </a:p>
-          <a:p>
-            <a:endParaRPr lang="en-US" sz="800" b="1" dirty="0">
+              <a:t>President, Strickland Institute</a:t>
+            </a:r>
+          </a:p>
+          <a:p>
+            <a:pPr algn="l"/>
+            <a:endParaRPr lang="en-US" sz="300" b="1" dirty="0">
               <a:latin typeface="Arial" panose="020B0604020202020204" pitchFamily="34" charset="0"/>
               <a:cs typeface="Arial" panose="020B0604020202020204" pitchFamily="34" charset="0"/>
             </a:endParaRPr>
           </a:p>
           <a:p>
-            <a:pPr marL="0" marR="0" lvl="0" indent="0" algn="just" defTabSz="731520" rtl="0" eaLnBrk="1" fontAlgn="auto" latinLnBrk="0" hangingPunct="1">
+            <a:pPr marL="0" marR="0" lvl="0" indent="0" algn="l" defTabSz="731520" rtl="0" eaLnBrk="1" fontAlgn="auto" latinLnBrk="0" hangingPunct="1">
               <a:lnSpc>
                 <a:spcPct val="90000"/>
               </a:lnSpc>
@@ -1164,7 +1158,7 @@
             </a:r>
           </a:p>
           <a:p>
-            <a:pPr marL="0" marR="0" lvl="0" indent="0" algn="just" defTabSz="731520" rtl="0" eaLnBrk="1" fontAlgn="auto" latinLnBrk="0" hangingPunct="1">
+            <a:pPr marL="0" marR="0" lvl="0" indent="0" algn="l" defTabSz="731520" rtl="0" eaLnBrk="1" fontAlgn="auto" latinLnBrk="0" hangingPunct="1">
               <a:lnSpc>
                 <a:spcPct val="90000"/>
               </a:lnSpc>
@@ -1182,7 +1176,7 @@
               <a:defRPr/>
             </a:pPr>
             <a:r>
-              <a:rPr kumimoji="0" lang="en-US" sz="1200" b="0" i="0" u="none" strike="noStrike" kern="1200" cap="none" spc="0" normalizeH="0" baseline="0" noProof="0" dirty="0" err="1">
+              <a:rPr kumimoji="0" lang="en-US" sz="1200" b="0" i="0" u="none" strike="noStrike" kern="1200" cap="none" spc="0" normalizeH="0" baseline="0" noProof="0" dirty="0">
                 <a:ln>
                   <a:noFill/>
                 </a:ln>
@@ -1196,22 +1190,8 @@
                 <a:ea typeface="+mn-ea"/>
                 <a:cs typeface="+mn-cs"/>
               </a:rPr>
-              <a:t>ilq@w.ipq</a:t>
-            </a:r>
-            <a:endParaRPr kumimoji="0" lang="en-US" sz="1200" b="0" i="0" u="none" strike="noStrike" kern="1200" cap="none" spc="0" normalizeH="0" baseline="0" noProof="0" dirty="0">
-              <a:ln>
-                <a:noFill/>
-              </a:ln>
-              <a:solidFill>
-                <a:srgbClr val="222222"/>
-              </a:solidFill>
-              <a:effectLst/>
-              <a:uLnTx/>
-              <a:uFillTx/>
-              <a:latin typeface="Raleway"/>
-              <a:ea typeface="+mn-ea"/>
-              <a:cs typeface="+mn-cs"/>
-            </a:endParaRPr>
+              <a:t>wstrickland@stricklandinstitute.org</a:t>
+            </a:r>
           </a:p>
         </p:txBody>
       </p:sp>
@@ -1229,8 +1209,8 @@
         </p:nvSpPr>
         <p:spPr>
           <a:xfrm>
-            <a:off x="237698" y="4228794"/>
-            <a:ext cx="2439296" cy="1188018"/>
+            <a:off x="237698" y="4482185"/>
+            <a:ext cx="2439296" cy="1292662"/>
           </a:xfrm>
           <a:prstGeom prst="rect">
             <a:avLst/>
@@ -1243,7 +1223,7 @@
           </a:bodyPr>
           <a:lstStyle/>
           <a:p>
-            <a:pPr marL="0" marR="0" lvl="0" indent="0" algn="just" defTabSz="731520" rtl="0" eaLnBrk="1" fontAlgn="auto" latinLnBrk="0" hangingPunct="1">
+            <a:pPr marL="0" marR="0" lvl="0" indent="0" algn="l" defTabSz="731520" rtl="0" eaLnBrk="1" fontAlgn="auto" latinLnBrk="0" hangingPunct="1">
               <a:lnSpc>
                 <a:spcPct val="90000"/>
               </a:lnSpc>
@@ -1275,11 +1255,11 @@
                 <a:ea typeface="+mn-ea"/>
                 <a:cs typeface="+mn-cs"/>
               </a:rPr>
-              <a:t>First Last</a:t>
-            </a:r>
-          </a:p>
-          <a:p>
-            <a:pPr marL="0" marR="0" lvl="0" indent="0" algn="just" defTabSz="731520" rtl="0" eaLnBrk="1" fontAlgn="auto" latinLnBrk="0" hangingPunct="1">
+              <a:t>Benjamin Waddell</a:t>
+            </a:r>
+          </a:p>
+          <a:p>
+            <a:pPr marL="0" marR="0" lvl="0" indent="0" algn="l" defTabSz="731520" rtl="0" eaLnBrk="1" fontAlgn="auto" latinLnBrk="0" hangingPunct="1">
               <a:lnSpc>
                 <a:spcPct val="90000"/>
               </a:lnSpc>
@@ -1311,17 +1291,18 @@
                 <a:ea typeface="+mn-ea"/>
                 <a:cs typeface="+mn-cs"/>
               </a:rPr>
-              <a:t>Title</a:t>
-            </a:r>
-          </a:p>
-          <a:p>
-            <a:endParaRPr lang="en-US" sz="800" b="1" dirty="0">
+              <a:t>Chief Executive Officer, Strickland Institute</a:t>
+            </a:r>
+          </a:p>
+          <a:p>
+            <a:pPr algn="l"/>
+            <a:endParaRPr lang="en-US" sz="300" b="1" dirty="0">
               <a:latin typeface="Arial" panose="020B0604020202020204" pitchFamily="34" charset="0"/>
               <a:cs typeface="Arial" panose="020B0604020202020204" pitchFamily="34" charset="0"/>
             </a:endParaRPr>
           </a:p>
           <a:p>
-            <a:pPr marL="0" marR="0" lvl="0" indent="0" algn="just" defTabSz="731520" rtl="0" eaLnBrk="1" fontAlgn="auto" latinLnBrk="0" hangingPunct="1">
+            <a:pPr marL="0" marR="0" lvl="0" indent="0" algn="l" defTabSz="731520" rtl="0" eaLnBrk="1" fontAlgn="auto" latinLnBrk="0" hangingPunct="1">
               <a:lnSpc>
                 <a:spcPct val="90000"/>
               </a:lnSpc>
@@ -1357,7 +1338,7 @@
             </a:r>
           </a:p>
           <a:p>
-            <a:pPr marL="0" marR="0" lvl="0" indent="0" algn="just" defTabSz="731520" rtl="0" eaLnBrk="1" fontAlgn="auto" latinLnBrk="0" hangingPunct="1">
+            <a:pPr marL="0" marR="0" lvl="0" indent="0" algn="l" defTabSz="731520" rtl="0" eaLnBrk="1" fontAlgn="auto" latinLnBrk="0" hangingPunct="1">
               <a:lnSpc>
                 <a:spcPct val="90000"/>
               </a:lnSpc>
@@ -1375,7 +1356,7 @@
               <a:defRPr/>
             </a:pPr>
             <a:r>
-              <a:rPr kumimoji="0" lang="en-US" sz="1200" b="0" i="0" u="none" strike="noStrike" kern="1200" cap="none" spc="0" normalizeH="0" baseline="0" noProof="0" dirty="0" err="1">
+              <a:rPr kumimoji="0" lang="en-US" sz="1200" b="0" i="0" u="none" strike="noStrike" kern="1200" cap="none" spc="0" normalizeH="0" baseline="0" noProof="0" dirty="0">
                 <a:ln>
                   <a:noFill/>
                 </a:ln>
@@ -1389,22 +1370,8 @@
                 <a:ea typeface="+mn-ea"/>
                 <a:cs typeface="+mn-cs"/>
               </a:rPr>
-              <a:t>ilq@w.ipq</a:t>
-            </a:r>
-            <a:endParaRPr kumimoji="0" lang="en-US" sz="1200" b="0" i="0" u="none" strike="noStrike" kern="1200" cap="none" spc="0" normalizeH="0" baseline="0" noProof="0" dirty="0">
-              <a:ln>
-                <a:noFill/>
-              </a:ln>
-              <a:solidFill>
-                <a:srgbClr val="222222"/>
-              </a:solidFill>
-              <a:effectLst/>
-              <a:uLnTx/>
-              <a:uFillTx/>
-              <a:latin typeface="Raleway"/>
-              <a:ea typeface="+mn-ea"/>
-              <a:cs typeface="+mn-cs"/>
-            </a:endParaRPr>
+              <a:t>bwaddell@stricklandinstitute.org</a:t>
+            </a:r>
           </a:p>
         </p:txBody>
       </p:sp>
@@ -1526,7 +1493,7 @@
                 <a:ea typeface="+mn-ea"/>
                 <a:cs typeface="+mn-cs"/>
               </a:rPr>
-              <a:t>9/13/2020</a:t>
+              <a:t>11/11/2020</a:t>
             </a:fld>
             <a:endParaRPr lang="en-US" sz="1100" kern="1200" noProof="0" dirty="0">
               <a:solidFill>
@@ -1592,7 +1559,7 @@
           <a:p>
             <a:fld id="{AA1B3A17-8F71-4D90-B050-8221C5D5D696}" type="datetimeFigureOut">
               <a:rPr lang="en-US" smtClean="0"/>
-              <a:t>9/13/2020</a:t>
+              <a:t>11/11/2020</a:t>
             </a:fld>
             <a:endParaRPr lang="en-US"/>
           </a:p>
@@ -2136,7 +2103,7 @@
         <p:spPr>
           <a:xfrm>
             <a:off x="426635" y="3935518"/>
-            <a:ext cx="4416425" cy="906463"/>
+            <a:ext cx="6314492" cy="906463"/>
           </a:xfrm>
         </p:spPr>
         <p:txBody>
@@ -2277,7 +2244,7 @@
           <a:p>
             <a:fld id="{AA1B3A17-8F71-4D90-B050-8221C5D5D696}" type="datetimeFigureOut">
               <a:rPr lang="en-US" smtClean="0"/>
-              <a:t>9/13/2020</a:t>
+              <a:t>11/11/2020</a:t>
             </a:fld>
             <a:endParaRPr lang="en-US"/>
           </a:p>
@@ -2862,7 +2829,7 @@
           <a:p>
             <a:fld id="{AA1B3A17-8F71-4D90-B050-8221C5D5D696}" type="datetimeFigureOut">
               <a:rPr lang="en-US" smtClean="0"/>
-              <a:t>9/13/2020</a:t>
+              <a:t>11/11/2020</a:t>
             </a:fld>
             <a:endParaRPr lang="en-US"/>
           </a:p>
@@ -3145,7 +3112,7 @@
           <a:p>
             <a:fld id="{AA1B3A17-8F71-4D90-B050-8221C5D5D696}" type="datetimeFigureOut">
               <a:rPr lang="en-US" smtClean="0"/>
-              <a:t>9/13/2020</a:t>
+              <a:t>11/11/2020</a:t>
             </a:fld>
             <a:endParaRPr lang="en-US"/>
           </a:p>
@@ -4701,7 +4668,7 @@
           <a:p>
             <a:fld id="{AA1B3A17-8F71-4D90-B050-8221C5D5D696}" type="datetimeFigureOut">
               <a:rPr lang="en-US" smtClean="0"/>
-              <a:t>9/13/2020</a:t>
+              <a:t>11/11/2020</a:t>
             </a:fld>
             <a:endParaRPr lang="en-US"/>
           </a:p>
@@ -5083,3118 +5050,6 @@
 </p:sldMaster>
 </file>
 
-<file path=ppt/slides/slide1.xml><?xml version="1.0" encoding="utf-8"?>
-<p:sld xmlns:a="http://schemas.openxmlformats.org/drawingml/2006/main" xmlns:r="http://schemas.openxmlformats.org/officeDocument/2006/relationships" xmlns:p="http://schemas.openxmlformats.org/presentationml/2006/main">
-  <p:cSld>
-    <p:spTree>
-      <p:nvGrpSpPr>
-        <p:cNvPr id="1" name=""/>
-        <p:cNvGrpSpPr/>
-        <p:nvPr/>
-      </p:nvGrpSpPr>
-      <p:grpSpPr>
-        <a:xfrm>
-          <a:off x="0" y="0"/>
-          <a:ext cx="0" cy="0"/>
-          <a:chOff x="0" y="0"/>
-          <a:chExt cx="0" cy="0"/>
-        </a:xfrm>
-      </p:grpSpPr>
-      <p:sp>
-        <p:nvSpPr>
-          <p:cNvPr id="2" name="Text Placeholder 1">
-            <a:extLst>
-              <a:ext uri="{FF2B5EF4-FFF2-40B4-BE49-F238E27FC236}">
-                <a16:creationId xmlns:a16="http://schemas.microsoft.com/office/drawing/2014/main" id="{690449FE-4109-40A6-94FE-3DA00AD20403}"/>
-              </a:ext>
-            </a:extLst>
-          </p:cNvPr>
-          <p:cNvSpPr>
-            <a:spLocks noGrp="1"/>
-          </p:cNvSpPr>
-          <p:nvPr>
-            <p:ph type="body" sz="quarter" idx="17"/>
-          </p:nvPr>
-        </p:nvSpPr>
-        <p:spPr/>
-        <p:txBody>
-          <a:bodyPr/>
-          <a:lstStyle/>
-          <a:p>
-            <a:endParaRPr lang="en-US"/>
-          </a:p>
-        </p:txBody>
-      </p:sp>
-      <p:sp>
-        <p:nvSpPr>
-          <p:cNvPr id="3" name="Content Placeholder 2">
-            <a:extLst>
-              <a:ext uri="{FF2B5EF4-FFF2-40B4-BE49-F238E27FC236}">
-                <a16:creationId xmlns:a16="http://schemas.microsoft.com/office/drawing/2014/main" id="{3C20B63A-903B-4EFD-ADF6-65167990870F}"/>
-              </a:ext>
-            </a:extLst>
-          </p:cNvPr>
-          <p:cNvSpPr>
-            <a:spLocks noGrp="1"/>
-          </p:cNvSpPr>
-          <p:nvPr>
-            <p:ph sz="half" idx="2"/>
-          </p:nvPr>
-        </p:nvSpPr>
-        <p:spPr/>
-        <p:txBody>
-          <a:bodyPr/>
-          <a:lstStyle/>
-          <a:p>
-            <a:endParaRPr lang="en-US"/>
-          </a:p>
-        </p:txBody>
-      </p:sp>
-      <p:sp>
-        <p:nvSpPr>
-          <p:cNvPr id="4" name="Picture Placeholder 3">
-            <a:extLst>
-              <a:ext uri="{FF2B5EF4-FFF2-40B4-BE49-F238E27FC236}">
-                <a16:creationId xmlns:a16="http://schemas.microsoft.com/office/drawing/2014/main" id="{44A4F737-09D5-4E32-9653-903A3123242D}"/>
-              </a:ext>
-            </a:extLst>
-          </p:cNvPr>
-          <p:cNvSpPr>
-            <a:spLocks noGrp="1"/>
-          </p:cNvSpPr>
-          <p:nvPr>
-            <p:ph type="pic" sz="quarter" idx="13"/>
-          </p:nvPr>
-        </p:nvSpPr>
-        <p:spPr/>
-      </p:sp>
-      <p:sp>
-        <p:nvSpPr>
-          <p:cNvPr id="5" name="Text Placeholder 4">
-            <a:extLst>
-              <a:ext uri="{FF2B5EF4-FFF2-40B4-BE49-F238E27FC236}">
-                <a16:creationId xmlns:a16="http://schemas.microsoft.com/office/drawing/2014/main" id="{B2896084-6756-4C68-A9CD-45B5DEBB37B6}"/>
-              </a:ext>
-            </a:extLst>
-          </p:cNvPr>
-          <p:cNvSpPr>
-            <a:spLocks noGrp="1"/>
-          </p:cNvSpPr>
-          <p:nvPr>
-            <p:ph type="body" sz="quarter" idx="16"/>
-          </p:nvPr>
-        </p:nvSpPr>
-        <p:spPr/>
-        <p:txBody>
-          <a:bodyPr/>
-          <a:lstStyle/>
-          <a:p>
-            <a:endParaRPr lang="en-US"/>
-          </a:p>
-        </p:txBody>
-      </p:sp>
-    </p:spTree>
-    <p:extLst>
-      <p:ext uri="{BB962C8B-B14F-4D97-AF65-F5344CB8AC3E}">
-        <p14:creationId xmlns:p14="http://schemas.microsoft.com/office/powerpoint/2010/main" val="1108788058"/>
-      </p:ext>
-    </p:extLst>
-  </p:cSld>
-  <p:clrMapOvr>
-    <a:masterClrMapping/>
-  </p:clrMapOvr>
-</p:sld>
-</file>
-
-<file path=ppt/slides/slide2.xml><?xml version="1.0" encoding="utf-8"?>
-<p:sld xmlns:a="http://schemas.openxmlformats.org/drawingml/2006/main" xmlns:r="http://schemas.openxmlformats.org/officeDocument/2006/relationships" xmlns:p="http://schemas.openxmlformats.org/presentationml/2006/main">
-  <p:cSld>
-    <p:spTree>
-      <p:nvGrpSpPr>
-        <p:cNvPr id="1" name=""/>
-        <p:cNvGrpSpPr/>
-        <p:nvPr/>
-      </p:nvGrpSpPr>
-      <p:grpSpPr>
-        <a:xfrm>
-          <a:off x="0" y="0"/>
-          <a:ext cx="0" cy="0"/>
-          <a:chOff x="0" y="0"/>
-          <a:chExt cx="0" cy="0"/>
-        </a:xfrm>
-      </p:grpSpPr>
-      <p:sp>
-        <p:nvSpPr>
-          <p:cNvPr id="2" name="Table Placeholder 1">
-            <a:extLst>
-              <a:ext uri="{FF2B5EF4-FFF2-40B4-BE49-F238E27FC236}">
-                <a16:creationId xmlns:a16="http://schemas.microsoft.com/office/drawing/2014/main" id="{5D76D015-3E69-4F52-A027-01E118105F5D}"/>
-              </a:ext>
-            </a:extLst>
-          </p:cNvPr>
-          <p:cNvSpPr>
-            <a:spLocks noGrp="1"/>
-          </p:cNvSpPr>
-          <p:nvPr>
-            <p:ph type="tbl" sz="quarter" idx="13"/>
-          </p:nvPr>
-        </p:nvSpPr>
-        <p:spPr/>
-      </p:sp>
-      <p:sp>
-        <p:nvSpPr>
-          <p:cNvPr id="3" name="Text Placeholder 2">
-            <a:extLst>
-              <a:ext uri="{FF2B5EF4-FFF2-40B4-BE49-F238E27FC236}">
-                <a16:creationId xmlns:a16="http://schemas.microsoft.com/office/drawing/2014/main" id="{1C630BFB-17EE-4FEA-A545-518278A6A33E}"/>
-              </a:ext>
-            </a:extLst>
-          </p:cNvPr>
-          <p:cNvSpPr>
-            <a:spLocks noGrp="1"/>
-          </p:cNvSpPr>
-          <p:nvPr>
-            <p:ph type="body" sz="quarter" idx="14"/>
-          </p:nvPr>
-        </p:nvSpPr>
-        <p:spPr/>
-        <p:txBody>
-          <a:bodyPr/>
-          <a:lstStyle/>
-          <a:p>
-            <a:endParaRPr lang="en-US"/>
-          </a:p>
-        </p:txBody>
-      </p:sp>
-    </p:spTree>
-    <p:extLst>
-      <p:ext uri="{BB962C8B-B14F-4D97-AF65-F5344CB8AC3E}">
-        <p14:creationId xmlns:p14="http://schemas.microsoft.com/office/powerpoint/2010/main" val="520491776"/>
-      </p:ext>
-    </p:extLst>
-  </p:cSld>
-  <p:clrMapOvr>
-    <a:masterClrMapping/>
-  </p:clrMapOvr>
-</p:sld>
-</file>
-
-<file path=ppt/slides/slide3.xml><?xml version="1.0" encoding="utf-8"?>
-<p:sld xmlns:a="http://schemas.openxmlformats.org/drawingml/2006/main" xmlns:r="http://schemas.openxmlformats.org/officeDocument/2006/relationships" xmlns:p="http://schemas.openxmlformats.org/presentationml/2006/main">
-  <p:cSld>
-    <p:spTree>
-      <p:nvGrpSpPr>
-        <p:cNvPr id="1" name=""/>
-        <p:cNvGrpSpPr/>
-        <p:nvPr/>
-      </p:nvGrpSpPr>
-      <p:grpSpPr>
-        <a:xfrm>
-          <a:off x="0" y="0"/>
-          <a:ext cx="0" cy="0"/>
-          <a:chOff x="0" y="0"/>
-          <a:chExt cx="0" cy="0"/>
-        </a:xfrm>
-      </p:grpSpPr>
-      <p:sp>
-        <p:nvSpPr>
-          <p:cNvPr id="2" name="Text Placeholder 1">
-            <a:extLst>
-              <a:ext uri="{FF2B5EF4-FFF2-40B4-BE49-F238E27FC236}">
-                <a16:creationId xmlns:a16="http://schemas.microsoft.com/office/drawing/2014/main" id="{B978F39F-2EDB-4F5C-884C-9E250E053547}"/>
-              </a:ext>
-            </a:extLst>
-          </p:cNvPr>
-          <p:cNvSpPr>
-            <a:spLocks noGrp="1"/>
-          </p:cNvSpPr>
-          <p:nvPr>
-            <p:ph type="body" sz="quarter" idx="17"/>
-          </p:nvPr>
-        </p:nvSpPr>
-        <p:spPr/>
-        <p:txBody>
-          <a:bodyPr>
-            <a:normAutofit fontScale="62500" lnSpcReduction="20000"/>
-          </a:bodyPr>
-          <a:lstStyle/>
-          <a:p>
-            <a:pPr marL="0" indent="0">
-              <a:buNone/>
-            </a:pPr>
-            <a:r>
-              <a:rPr lang="en-US" b="0" i="0" dirty="0">
-                <a:solidFill>
-                  <a:srgbClr val="222222"/>
-                </a:solidFill>
-                <a:effectLst/>
-                <a:latin typeface="Raleway"/>
-              </a:rPr>
-              <a:t>Sit </a:t>
-            </a:r>
-            <a:r>
-              <a:rPr lang="en-US" b="0" i="0" dirty="0" err="1">
-                <a:solidFill>
-                  <a:srgbClr val="222222"/>
-                </a:solidFill>
-                <a:effectLst/>
-                <a:latin typeface="Raleway"/>
-              </a:rPr>
-              <a:t>numquam</a:t>
-            </a:r>
-            <a:r>
-              <a:rPr lang="en-US" b="0" i="0" dirty="0">
-                <a:solidFill>
-                  <a:srgbClr val="222222"/>
-                </a:solidFill>
-                <a:effectLst/>
-                <a:latin typeface="Raleway"/>
-              </a:rPr>
-              <a:t> dolor </a:t>
-            </a:r>
-            <a:r>
-              <a:rPr lang="en-US" b="0" i="0" dirty="0" err="1">
-                <a:solidFill>
-                  <a:srgbClr val="222222"/>
-                </a:solidFill>
-                <a:effectLst/>
-                <a:latin typeface="Raleway"/>
-              </a:rPr>
-              <a:t>est</a:t>
-            </a:r>
-            <a:r>
-              <a:rPr lang="en-US" b="0" i="0" dirty="0">
-                <a:solidFill>
-                  <a:srgbClr val="222222"/>
-                </a:solidFill>
-                <a:effectLst/>
-                <a:latin typeface="Raleway"/>
-              </a:rPr>
-              <a:t> dolore </a:t>
-            </a:r>
-            <a:r>
-              <a:rPr lang="en-US" b="0" i="0" dirty="0" err="1">
-                <a:solidFill>
-                  <a:srgbClr val="222222"/>
-                </a:solidFill>
-                <a:effectLst/>
-                <a:latin typeface="Raleway"/>
-              </a:rPr>
-              <a:t>modi</a:t>
-            </a:r>
-            <a:r>
-              <a:rPr lang="en-US" b="0" i="0" dirty="0">
-                <a:solidFill>
-                  <a:srgbClr val="222222"/>
-                </a:solidFill>
-                <a:effectLst/>
-                <a:latin typeface="Raleway"/>
-              </a:rPr>
-              <a:t>. </a:t>
-            </a:r>
-            <a:r>
-              <a:rPr lang="en-US" b="0" i="0" dirty="0" err="1">
-                <a:solidFill>
-                  <a:srgbClr val="222222"/>
-                </a:solidFill>
-                <a:effectLst/>
-                <a:latin typeface="Raleway"/>
-              </a:rPr>
-              <a:t>Magnam</a:t>
-            </a:r>
-            <a:r>
-              <a:rPr lang="en-US" b="0" i="0" dirty="0">
-                <a:solidFill>
-                  <a:srgbClr val="222222"/>
-                </a:solidFill>
-                <a:effectLst/>
-                <a:latin typeface="Raleway"/>
-              </a:rPr>
-              <a:t> </a:t>
-            </a:r>
-            <a:r>
-              <a:rPr lang="en-US" b="0" i="0" dirty="0" err="1">
-                <a:solidFill>
-                  <a:srgbClr val="222222"/>
-                </a:solidFill>
-                <a:effectLst/>
-                <a:latin typeface="Raleway"/>
-              </a:rPr>
-              <a:t>porro</a:t>
-            </a:r>
-            <a:r>
-              <a:rPr lang="en-US" b="0" i="0" dirty="0">
-                <a:solidFill>
-                  <a:srgbClr val="222222"/>
-                </a:solidFill>
-                <a:effectLst/>
-                <a:latin typeface="Raleway"/>
-              </a:rPr>
-              <a:t> </a:t>
-            </a:r>
-            <a:r>
-              <a:rPr lang="en-US" b="0" i="0" dirty="0" err="1">
-                <a:solidFill>
-                  <a:srgbClr val="222222"/>
-                </a:solidFill>
-                <a:effectLst/>
-                <a:latin typeface="Raleway"/>
-              </a:rPr>
-              <a:t>modi</a:t>
-            </a:r>
-            <a:r>
-              <a:rPr lang="en-US" b="0" i="0" dirty="0">
-                <a:solidFill>
-                  <a:srgbClr val="222222"/>
-                </a:solidFill>
-                <a:effectLst/>
-                <a:latin typeface="Raleway"/>
-              </a:rPr>
-              <a:t> </a:t>
-            </a:r>
-            <a:r>
-              <a:rPr lang="en-US" b="0" i="0" dirty="0" err="1">
-                <a:solidFill>
-                  <a:srgbClr val="222222"/>
-                </a:solidFill>
-                <a:effectLst/>
-                <a:latin typeface="Raleway"/>
-              </a:rPr>
-              <a:t>etincidunt</a:t>
-            </a:r>
-            <a:r>
-              <a:rPr lang="en-US" b="0" i="0" dirty="0">
-                <a:solidFill>
-                  <a:srgbClr val="222222"/>
-                </a:solidFill>
-                <a:effectLst/>
-                <a:latin typeface="Raleway"/>
-              </a:rPr>
-              <a:t> </a:t>
-            </a:r>
-            <a:r>
-              <a:rPr lang="en-US" b="0" i="0" dirty="0" err="1">
-                <a:solidFill>
-                  <a:srgbClr val="222222"/>
-                </a:solidFill>
-                <a:effectLst/>
-                <a:latin typeface="Raleway"/>
-              </a:rPr>
-              <a:t>voluptatem</a:t>
-            </a:r>
-            <a:r>
-              <a:rPr lang="en-US" b="0" i="0" dirty="0">
-                <a:solidFill>
-                  <a:srgbClr val="222222"/>
-                </a:solidFill>
-                <a:effectLst/>
-                <a:latin typeface="Raleway"/>
-              </a:rPr>
-              <a:t> </a:t>
-            </a:r>
-            <a:r>
-              <a:rPr lang="en-US" b="0" i="0" dirty="0" err="1">
-                <a:solidFill>
-                  <a:srgbClr val="222222"/>
-                </a:solidFill>
-                <a:effectLst/>
-                <a:latin typeface="Raleway"/>
-              </a:rPr>
-              <a:t>tempora</a:t>
-            </a:r>
-            <a:r>
-              <a:rPr lang="en-US" b="0" i="0" dirty="0">
-                <a:solidFill>
-                  <a:srgbClr val="222222"/>
-                </a:solidFill>
-                <a:effectLst/>
-                <a:latin typeface="Raleway"/>
-              </a:rPr>
-              <a:t>. Ut </a:t>
-            </a:r>
-            <a:r>
-              <a:rPr lang="en-US" b="0" i="0" dirty="0" err="1">
-                <a:solidFill>
-                  <a:srgbClr val="222222"/>
-                </a:solidFill>
-                <a:effectLst/>
-                <a:latin typeface="Raleway"/>
-              </a:rPr>
-              <a:t>consectetur</a:t>
-            </a:r>
-            <a:r>
-              <a:rPr lang="en-US" b="0" i="0" dirty="0">
-                <a:solidFill>
-                  <a:srgbClr val="222222"/>
-                </a:solidFill>
-                <a:effectLst/>
-                <a:latin typeface="Raleway"/>
-              </a:rPr>
-              <a:t> </a:t>
-            </a:r>
-            <a:r>
-              <a:rPr lang="en-US" b="0" i="0" dirty="0" err="1">
-                <a:solidFill>
-                  <a:srgbClr val="222222"/>
-                </a:solidFill>
-                <a:effectLst/>
-                <a:latin typeface="Raleway"/>
-              </a:rPr>
-              <a:t>voluptatem</a:t>
-            </a:r>
-            <a:r>
-              <a:rPr lang="en-US" b="0" i="0" dirty="0">
-                <a:solidFill>
-                  <a:srgbClr val="222222"/>
-                </a:solidFill>
-                <a:effectLst/>
-                <a:latin typeface="Raleway"/>
-              </a:rPr>
-              <a:t> dolore </a:t>
-            </a:r>
-            <a:r>
-              <a:rPr lang="en-US" b="0" i="0" dirty="0" err="1">
-                <a:solidFill>
-                  <a:srgbClr val="222222"/>
-                </a:solidFill>
-                <a:effectLst/>
-                <a:latin typeface="Raleway"/>
-              </a:rPr>
-              <a:t>quiquia</a:t>
-            </a:r>
-            <a:r>
-              <a:rPr lang="en-US" b="0" i="0" dirty="0">
-                <a:solidFill>
-                  <a:srgbClr val="222222"/>
-                </a:solidFill>
-                <a:effectLst/>
-                <a:latin typeface="Raleway"/>
-              </a:rPr>
-              <a:t>. </a:t>
-            </a:r>
-            <a:r>
-              <a:rPr lang="en-US" b="0" i="0" dirty="0" err="1">
-                <a:solidFill>
-                  <a:srgbClr val="222222"/>
-                </a:solidFill>
-                <a:effectLst/>
-                <a:latin typeface="Raleway"/>
-              </a:rPr>
-              <a:t>Voluptatem</a:t>
-            </a:r>
-            <a:r>
-              <a:rPr lang="en-US" b="0" i="0" dirty="0">
-                <a:solidFill>
-                  <a:srgbClr val="222222"/>
-                </a:solidFill>
-                <a:effectLst/>
-                <a:latin typeface="Raleway"/>
-              </a:rPr>
-              <a:t> </a:t>
-            </a:r>
-            <a:r>
-              <a:rPr lang="en-US" b="0" i="0" dirty="0" err="1">
-                <a:solidFill>
-                  <a:srgbClr val="222222"/>
-                </a:solidFill>
-                <a:effectLst/>
-                <a:latin typeface="Raleway"/>
-              </a:rPr>
-              <a:t>quaerat</a:t>
-            </a:r>
-            <a:r>
-              <a:rPr lang="en-US" b="0" i="0" dirty="0">
-                <a:solidFill>
-                  <a:srgbClr val="222222"/>
-                </a:solidFill>
-                <a:effectLst/>
-                <a:latin typeface="Raleway"/>
-              </a:rPr>
-              <a:t> </a:t>
-            </a:r>
-            <a:r>
-              <a:rPr lang="en-US" b="0" i="0" dirty="0" err="1">
-                <a:solidFill>
-                  <a:srgbClr val="222222"/>
-                </a:solidFill>
-                <a:effectLst/>
-                <a:latin typeface="Raleway"/>
-              </a:rPr>
-              <a:t>numquam</a:t>
-            </a:r>
-            <a:r>
-              <a:rPr lang="en-US" b="0" i="0" dirty="0">
-                <a:solidFill>
-                  <a:srgbClr val="222222"/>
-                </a:solidFill>
-                <a:effectLst/>
-                <a:latin typeface="Raleway"/>
-              </a:rPr>
-              <a:t> </a:t>
-            </a:r>
-            <a:r>
-              <a:rPr lang="en-US" b="0" i="0" dirty="0" err="1">
-                <a:solidFill>
-                  <a:srgbClr val="222222"/>
-                </a:solidFill>
-                <a:effectLst/>
-                <a:latin typeface="Raleway"/>
-              </a:rPr>
-              <a:t>modi</a:t>
-            </a:r>
-            <a:r>
-              <a:rPr lang="en-US" b="0" i="0" dirty="0">
-                <a:solidFill>
-                  <a:srgbClr val="222222"/>
-                </a:solidFill>
-                <a:effectLst/>
-                <a:latin typeface="Raleway"/>
-              </a:rPr>
-              <a:t> sit dolore </a:t>
-            </a:r>
-            <a:r>
-              <a:rPr lang="en-US" b="0" i="0" dirty="0" err="1">
-                <a:solidFill>
-                  <a:srgbClr val="222222"/>
-                </a:solidFill>
-                <a:effectLst/>
-                <a:latin typeface="Raleway"/>
-              </a:rPr>
-              <a:t>neque</a:t>
-            </a:r>
-            <a:r>
-              <a:rPr lang="en-US" b="0" i="0" dirty="0">
-                <a:solidFill>
-                  <a:srgbClr val="222222"/>
-                </a:solidFill>
-                <a:effectLst/>
-                <a:latin typeface="Raleway"/>
-              </a:rPr>
-              <a:t>. Non </a:t>
-            </a:r>
-            <a:r>
-              <a:rPr lang="en-US" b="0" i="0" dirty="0" err="1">
-                <a:solidFill>
-                  <a:srgbClr val="222222"/>
-                </a:solidFill>
-                <a:effectLst/>
-                <a:latin typeface="Raleway"/>
-              </a:rPr>
-              <a:t>ut</a:t>
-            </a:r>
-            <a:r>
-              <a:rPr lang="en-US" b="0" i="0" dirty="0">
-                <a:solidFill>
-                  <a:srgbClr val="222222"/>
-                </a:solidFill>
-                <a:effectLst/>
-                <a:latin typeface="Raleway"/>
-              </a:rPr>
-              <a:t> </a:t>
-            </a:r>
-            <a:r>
-              <a:rPr lang="en-US" b="0" i="0" dirty="0" err="1">
-                <a:solidFill>
-                  <a:srgbClr val="222222"/>
-                </a:solidFill>
-                <a:effectLst/>
-                <a:latin typeface="Raleway"/>
-              </a:rPr>
-              <a:t>consectetur</a:t>
-            </a:r>
-            <a:r>
-              <a:rPr lang="en-US" b="0" i="0" dirty="0">
-                <a:solidFill>
-                  <a:srgbClr val="222222"/>
-                </a:solidFill>
-                <a:effectLst/>
-                <a:latin typeface="Raleway"/>
-              </a:rPr>
-              <a:t> </a:t>
-            </a:r>
-            <a:r>
-              <a:rPr lang="en-US" b="0" i="0" dirty="0" err="1">
-                <a:solidFill>
-                  <a:srgbClr val="222222"/>
-                </a:solidFill>
-                <a:effectLst/>
-                <a:latin typeface="Raleway"/>
-              </a:rPr>
-              <a:t>etincidunt</a:t>
-            </a:r>
-            <a:r>
-              <a:rPr lang="en-US" b="0" i="0" dirty="0">
-                <a:solidFill>
-                  <a:srgbClr val="222222"/>
-                </a:solidFill>
-                <a:effectLst/>
-                <a:latin typeface="Raleway"/>
-              </a:rPr>
-              <a:t> non dolore </a:t>
-            </a:r>
-            <a:r>
-              <a:rPr lang="en-US" b="0" i="0" dirty="0" err="1">
-                <a:solidFill>
-                  <a:srgbClr val="222222"/>
-                </a:solidFill>
-                <a:effectLst/>
-                <a:latin typeface="Raleway"/>
-              </a:rPr>
-              <a:t>neque</a:t>
-            </a:r>
-            <a:r>
-              <a:rPr lang="en-US" b="0" i="0" dirty="0">
-                <a:solidFill>
-                  <a:srgbClr val="222222"/>
-                </a:solidFill>
-                <a:effectLst/>
-                <a:latin typeface="Raleway"/>
-              </a:rPr>
-              <a:t> </a:t>
-            </a:r>
-            <a:r>
-              <a:rPr lang="en-US" b="0" i="0" dirty="0" err="1">
-                <a:solidFill>
-                  <a:srgbClr val="222222"/>
-                </a:solidFill>
-                <a:effectLst/>
-                <a:latin typeface="Raleway"/>
-              </a:rPr>
-              <a:t>aliquam</a:t>
-            </a:r>
-            <a:r>
-              <a:rPr lang="en-US" b="0" i="0" dirty="0">
-                <a:solidFill>
-                  <a:srgbClr val="222222"/>
-                </a:solidFill>
-                <a:effectLst/>
-                <a:latin typeface="Raleway"/>
-              </a:rPr>
-              <a:t>. Non </a:t>
-            </a:r>
-            <a:r>
-              <a:rPr lang="en-US" b="0" i="0" dirty="0" err="1">
-                <a:solidFill>
-                  <a:srgbClr val="222222"/>
-                </a:solidFill>
-                <a:effectLst/>
-                <a:latin typeface="Raleway"/>
-              </a:rPr>
-              <a:t>velit</a:t>
-            </a:r>
-            <a:r>
-              <a:rPr lang="en-US" b="0" i="0" dirty="0">
-                <a:solidFill>
-                  <a:srgbClr val="222222"/>
-                </a:solidFill>
-                <a:effectLst/>
-                <a:latin typeface="Raleway"/>
-              </a:rPr>
-              <a:t> </a:t>
-            </a:r>
-            <a:r>
-              <a:rPr lang="en-US" b="0" i="0" dirty="0" err="1">
-                <a:solidFill>
-                  <a:srgbClr val="222222"/>
-                </a:solidFill>
-                <a:effectLst/>
-                <a:latin typeface="Raleway"/>
-              </a:rPr>
-              <a:t>velit</a:t>
-            </a:r>
-            <a:r>
-              <a:rPr lang="en-US" b="0" i="0" dirty="0">
-                <a:solidFill>
-                  <a:srgbClr val="222222"/>
-                </a:solidFill>
-                <a:effectLst/>
-                <a:latin typeface="Raleway"/>
-              </a:rPr>
-              <a:t> </a:t>
-            </a:r>
-            <a:r>
-              <a:rPr lang="en-US" b="0" i="0" dirty="0" err="1">
-                <a:solidFill>
-                  <a:srgbClr val="222222"/>
-                </a:solidFill>
-                <a:effectLst/>
-                <a:latin typeface="Raleway"/>
-              </a:rPr>
-              <a:t>voluptatem</a:t>
-            </a:r>
-            <a:r>
-              <a:rPr lang="en-US" b="0" i="0" dirty="0">
-                <a:solidFill>
-                  <a:srgbClr val="222222"/>
-                </a:solidFill>
-                <a:effectLst/>
-                <a:latin typeface="Raleway"/>
-              </a:rPr>
-              <a:t> </a:t>
-            </a:r>
-            <a:r>
-              <a:rPr lang="en-US" b="0" i="0" dirty="0" err="1">
-                <a:solidFill>
-                  <a:srgbClr val="222222"/>
-                </a:solidFill>
-                <a:effectLst/>
-                <a:latin typeface="Raleway"/>
-              </a:rPr>
-              <a:t>dolorem</a:t>
-            </a:r>
-            <a:r>
-              <a:rPr lang="en-US" b="0" i="0" dirty="0">
-                <a:solidFill>
-                  <a:srgbClr val="222222"/>
-                </a:solidFill>
-                <a:effectLst/>
-                <a:latin typeface="Raleway"/>
-              </a:rPr>
-              <a:t> </a:t>
-            </a:r>
-            <a:r>
-              <a:rPr lang="en-US" b="0" i="0" dirty="0" err="1">
-                <a:solidFill>
-                  <a:srgbClr val="222222"/>
-                </a:solidFill>
-                <a:effectLst/>
-                <a:latin typeface="Raleway"/>
-              </a:rPr>
-              <a:t>consectetur</a:t>
-            </a:r>
-            <a:r>
-              <a:rPr lang="en-US" b="0" i="0" dirty="0">
-                <a:solidFill>
-                  <a:srgbClr val="222222"/>
-                </a:solidFill>
-                <a:effectLst/>
-                <a:latin typeface="Raleway"/>
-              </a:rPr>
-              <a:t> </a:t>
-            </a:r>
-            <a:r>
-              <a:rPr lang="en-US" b="0" i="0" dirty="0" err="1">
-                <a:solidFill>
-                  <a:srgbClr val="222222"/>
-                </a:solidFill>
-                <a:effectLst/>
-                <a:latin typeface="Raleway"/>
-              </a:rPr>
-              <a:t>amet</a:t>
-            </a:r>
-            <a:r>
-              <a:rPr lang="en-US" b="0" i="0" dirty="0">
-                <a:solidFill>
-                  <a:srgbClr val="222222"/>
-                </a:solidFill>
-                <a:effectLst/>
-                <a:latin typeface="Raleway"/>
-              </a:rPr>
-              <a:t> </a:t>
-            </a:r>
-            <a:r>
-              <a:rPr lang="en-US" b="0" i="0" dirty="0" err="1">
-                <a:solidFill>
-                  <a:srgbClr val="222222"/>
-                </a:solidFill>
-                <a:effectLst/>
-                <a:latin typeface="Raleway"/>
-              </a:rPr>
-              <a:t>modi</a:t>
-            </a:r>
-            <a:r>
-              <a:rPr lang="en-US" b="0" i="0" dirty="0">
-                <a:solidFill>
-                  <a:srgbClr val="222222"/>
-                </a:solidFill>
-                <a:effectLst/>
-                <a:latin typeface="Raleway"/>
-              </a:rPr>
-              <a:t>. Ut </a:t>
-            </a:r>
-            <a:r>
-              <a:rPr lang="en-US" b="0" i="0" dirty="0" err="1">
-                <a:solidFill>
-                  <a:srgbClr val="222222"/>
-                </a:solidFill>
-                <a:effectLst/>
-                <a:latin typeface="Raleway"/>
-              </a:rPr>
-              <a:t>velit</a:t>
-            </a:r>
-            <a:r>
-              <a:rPr lang="en-US" b="0" i="0" dirty="0">
-                <a:solidFill>
-                  <a:srgbClr val="222222"/>
-                </a:solidFill>
-                <a:effectLst/>
-                <a:latin typeface="Raleway"/>
-              </a:rPr>
-              <a:t> </a:t>
-            </a:r>
-            <a:r>
-              <a:rPr lang="en-US" b="0" i="0" dirty="0" err="1">
-                <a:solidFill>
-                  <a:srgbClr val="222222"/>
-                </a:solidFill>
-                <a:effectLst/>
-                <a:latin typeface="Raleway"/>
-              </a:rPr>
-              <a:t>labore</a:t>
-            </a:r>
-            <a:r>
-              <a:rPr lang="en-US" b="0" i="0" dirty="0">
-                <a:solidFill>
-                  <a:srgbClr val="222222"/>
-                </a:solidFill>
-                <a:effectLst/>
-                <a:latin typeface="Raleway"/>
-              </a:rPr>
-              <a:t> </a:t>
-            </a:r>
-            <a:r>
-              <a:rPr lang="en-US" b="0" i="0" dirty="0" err="1">
-                <a:solidFill>
-                  <a:srgbClr val="222222"/>
-                </a:solidFill>
-                <a:effectLst/>
-                <a:latin typeface="Raleway"/>
-              </a:rPr>
-              <a:t>tempora.Sit</a:t>
-            </a:r>
-            <a:r>
-              <a:rPr lang="en-US" b="0" i="0" dirty="0">
-                <a:solidFill>
-                  <a:srgbClr val="222222"/>
-                </a:solidFill>
-                <a:effectLst/>
-                <a:latin typeface="Raleway"/>
-              </a:rPr>
-              <a:t> </a:t>
-            </a:r>
-            <a:r>
-              <a:rPr lang="en-US" b="0" i="0" dirty="0" err="1">
-                <a:solidFill>
-                  <a:srgbClr val="222222"/>
-                </a:solidFill>
-                <a:effectLst/>
-                <a:latin typeface="Raleway"/>
-              </a:rPr>
-              <a:t>numquam</a:t>
-            </a:r>
-            <a:r>
-              <a:rPr lang="en-US" b="0" i="0" dirty="0">
-                <a:solidFill>
-                  <a:srgbClr val="222222"/>
-                </a:solidFill>
-                <a:effectLst/>
-                <a:latin typeface="Raleway"/>
-              </a:rPr>
-              <a:t> dolor </a:t>
-            </a:r>
-            <a:r>
-              <a:rPr lang="en-US" b="0" i="0" dirty="0" err="1">
-                <a:solidFill>
-                  <a:srgbClr val="222222"/>
-                </a:solidFill>
-                <a:effectLst/>
-                <a:latin typeface="Raleway"/>
-              </a:rPr>
-              <a:t>est</a:t>
-            </a:r>
-            <a:r>
-              <a:rPr lang="en-US" b="0" i="0" dirty="0">
-                <a:solidFill>
-                  <a:srgbClr val="222222"/>
-                </a:solidFill>
-                <a:effectLst/>
-                <a:latin typeface="Raleway"/>
-              </a:rPr>
-              <a:t> dolore </a:t>
-            </a:r>
-            <a:r>
-              <a:rPr lang="en-US" b="0" i="0" dirty="0" err="1">
-                <a:solidFill>
-                  <a:srgbClr val="222222"/>
-                </a:solidFill>
-                <a:effectLst/>
-                <a:latin typeface="Raleway"/>
-              </a:rPr>
-              <a:t>modi</a:t>
-            </a:r>
-            <a:r>
-              <a:rPr lang="en-US" b="0" i="0" dirty="0">
-                <a:solidFill>
-                  <a:srgbClr val="222222"/>
-                </a:solidFill>
-                <a:effectLst/>
-                <a:latin typeface="Raleway"/>
-              </a:rPr>
-              <a:t>. </a:t>
-            </a:r>
-            <a:r>
-              <a:rPr lang="en-US" b="0" i="0" dirty="0" err="1">
-                <a:solidFill>
-                  <a:srgbClr val="222222"/>
-                </a:solidFill>
-                <a:effectLst/>
-                <a:latin typeface="Raleway"/>
-              </a:rPr>
-              <a:t>Magnam</a:t>
-            </a:r>
-            <a:r>
-              <a:rPr lang="en-US" b="0" i="0" dirty="0">
-                <a:solidFill>
-                  <a:srgbClr val="222222"/>
-                </a:solidFill>
-                <a:effectLst/>
-                <a:latin typeface="Raleway"/>
-              </a:rPr>
-              <a:t> </a:t>
-            </a:r>
-            <a:r>
-              <a:rPr lang="en-US" b="0" i="0" dirty="0" err="1">
-                <a:solidFill>
-                  <a:srgbClr val="222222"/>
-                </a:solidFill>
-                <a:effectLst/>
-                <a:latin typeface="Raleway"/>
-              </a:rPr>
-              <a:t>porro</a:t>
-            </a:r>
-            <a:r>
-              <a:rPr lang="en-US" b="0" i="0" dirty="0">
-                <a:solidFill>
-                  <a:srgbClr val="222222"/>
-                </a:solidFill>
-                <a:effectLst/>
-                <a:latin typeface="Raleway"/>
-              </a:rPr>
-              <a:t> </a:t>
-            </a:r>
-            <a:r>
-              <a:rPr lang="en-US" b="0" i="0" dirty="0" err="1">
-                <a:solidFill>
-                  <a:srgbClr val="222222"/>
-                </a:solidFill>
-                <a:effectLst/>
-                <a:latin typeface="Raleway"/>
-              </a:rPr>
-              <a:t>modi</a:t>
-            </a:r>
-            <a:r>
-              <a:rPr lang="en-US" b="0" i="0" dirty="0">
-                <a:solidFill>
-                  <a:srgbClr val="222222"/>
-                </a:solidFill>
-                <a:effectLst/>
-                <a:latin typeface="Raleway"/>
-              </a:rPr>
-              <a:t> </a:t>
-            </a:r>
-            <a:r>
-              <a:rPr lang="en-US" b="0" i="0" dirty="0" err="1">
-                <a:solidFill>
-                  <a:srgbClr val="222222"/>
-                </a:solidFill>
-                <a:effectLst/>
-                <a:latin typeface="Raleway"/>
-              </a:rPr>
-              <a:t>etincidunt</a:t>
-            </a:r>
-            <a:r>
-              <a:rPr lang="en-US" b="0" i="0" dirty="0">
-                <a:solidFill>
-                  <a:srgbClr val="222222"/>
-                </a:solidFill>
-                <a:effectLst/>
-                <a:latin typeface="Raleway"/>
-              </a:rPr>
-              <a:t> </a:t>
-            </a:r>
-            <a:r>
-              <a:rPr lang="en-US" b="0" i="0" dirty="0" err="1">
-                <a:solidFill>
-                  <a:srgbClr val="222222"/>
-                </a:solidFill>
-                <a:effectLst/>
-                <a:latin typeface="Raleway"/>
-              </a:rPr>
-              <a:t>voluptatem</a:t>
-            </a:r>
-            <a:r>
-              <a:rPr lang="en-US" b="0" i="0" dirty="0">
-                <a:solidFill>
-                  <a:srgbClr val="222222"/>
-                </a:solidFill>
-                <a:effectLst/>
-                <a:latin typeface="Raleway"/>
-              </a:rPr>
-              <a:t> </a:t>
-            </a:r>
-            <a:r>
-              <a:rPr lang="en-US" b="0" i="0" dirty="0" err="1">
-                <a:solidFill>
-                  <a:srgbClr val="222222"/>
-                </a:solidFill>
-                <a:effectLst/>
-                <a:latin typeface="Raleway"/>
-              </a:rPr>
-              <a:t>tempora</a:t>
-            </a:r>
-            <a:r>
-              <a:rPr lang="en-US" b="0" i="0" dirty="0">
-                <a:solidFill>
-                  <a:srgbClr val="222222"/>
-                </a:solidFill>
-                <a:effectLst/>
-                <a:latin typeface="Raleway"/>
-              </a:rPr>
-              <a:t>. Ut </a:t>
-            </a:r>
-            <a:r>
-              <a:rPr lang="en-US" b="0" i="0" dirty="0" err="1">
-                <a:solidFill>
-                  <a:srgbClr val="222222"/>
-                </a:solidFill>
-                <a:effectLst/>
-                <a:latin typeface="Raleway"/>
-              </a:rPr>
-              <a:t>consectetur</a:t>
-            </a:r>
-            <a:r>
-              <a:rPr lang="en-US" b="0" i="0" dirty="0">
-                <a:solidFill>
-                  <a:srgbClr val="222222"/>
-                </a:solidFill>
-                <a:effectLst/>
-                <a:latin typeface="Raleway"/>
-              </a:rPr>
-              <a:t> </a:t>
-            </a:r>
-            <a:r>
-              <a:rPr lang="en-US" b="0" i="0" dirty="0" err="1">
-                <a:solidFill>
-                  <a:srgbClr val="222222"/>
-                </a:solidFill>
-                <a:effectLst/>
-                <a:latin typeface="Raleway"/>
-              </a:rPr>
-              <a:t>voluptatem</a:t>
-            </a:r>
-            <a:r>
-              <a:rPr lang="en-US" b="0" i="0" dirty="0">
-                <a:solidFill>
-                  <a:srgbClr val="222222"/>
-                </a:solidFill>
-                <a:effectLst/>
-                <a:latin typeface="Raleway"/>
-              </a:rPr>
-              <a:t> dolore </a:t>
-            </a:r>
-            <a:r>
-              <a:rPr lang="en-US" b="0" i="0" dirty="0" err="1">
-                <a:solidFill>
-                  <a:srgbClr val="222222"/>
-                </a:solidFill>
-                <a:effectLst/>
-                <a:latin typeface="Raleway"/>
-              </a:rPr>
-              <a:t>quiquia</a:t>
-            </a:r>
-            <a:r>
-              <a:rPr lang="en-US" b="0" i="0" dirty="0">
-                <a:solidFill>
-                  <a:srgbClr val="222222"/>
-                </a:solidFill>
-                <a:effectLst/>
-                <a:latin typeface="Raleway"/>
-              </a:rPr>
-              <a:t>. </a:t>
-            </a:r>
-            <a:r>
-              <a:rPr lang="en-US" b="0" i="0" dirty="0" err="1">
-                <a:solidFill>
-                  <a:srgbClr val="222222"/>
-                </a:solidFill>
-                <a:effectLst/>
-                <a:latin typeface="Raleway"/>
-              </a:rPr>
-              <a:t>Voluptatem</a:t>
-            </a:r>
-            <a:r>
-              <a:rPr lang="en-US" b="0" i="0" dirty="0">
-                <a:solidFill>
-                  <a:srgbClr val="222222"/>
-                </a:solidFill>
-                <a:effectLst/>
-                <a:latin typeface="Raleway"/>
-              </a:rPr>
-              <a:t> </a:t>
-            </a:r>
-            <a:r>
-              <a:rPr lang="en-US" b="0" i="0" dirty="0" err="1">
-                <a:solidFill>
-                  <a:srgbClr val="222222"/>
-                </a:solidFill>
-                <a:effectLst/>
-                <a:latin typeface="Raleway"/>
-              </a:rPr>
-              <a:t>quaerat</a:t>
-            </a:r>
-            <a:r>
-              <a:rPr lang="en-US" b="0" i="0" dirty="0">
-                <a:solidFill>
-                  <a:srgbClr val="222222"/>
-                </a:solidFill>
-                <a:effectLst/>
-                <a:latin typeface="Raleway"/>
-              </a:rPr>
-              <a:t> </a:t>
-            </a:r>
-            <a:r>
-              <a:rPr lang="en-US" b="0" i="0" dirty="0" err="1">
-                <a:solidFill>
-                  <a:srgbClr val="222222"/>
-                </a:solidFill>
-                <a:effectLst/>
-                <a:latin typeface="Raleway"/>
-              </a:rPr>
-              <a:t>numquam</a:t>
-            </a:r>
-            <a:r>
-              <a:rPr lang="en-US" b="0" i="0" dirty="0">
-                <a:solidFill>
-                  <a:srgbClr val="222222"/>
-                </a:solidFill>
-                <a:effectLst/>
-                <a:latin typeface="Raleway"/>
-              </a:rPr>
-              <a:t> </a:t>
-            </a:r>
-            <a:r>
-              <a:rPr lang="en-US" b="0" i="0" dirty="0" err="1">
-                <a:solidFill>
-                  <a:srgbClr val="222222"/>
-                </a:solidFill>
-                <a:effectLst/>
-                <a:latin typeface="Raleway"/>
-              </a:rPr>
-              <a:t>modi</a:t>
-            </a:r>
-            <a:r>
-              <a:rPr lang="en-US" b="0" i="0" dirty="0">
-                <a:solidFill>
-                  <a:srgbClr val="222222"/>
-                </a:solidFill>
-                <a:effectLst/>
-                <a:latin typeface="Raleway"/>
-              </a:rPr>
-              <a:t> sit dolore </a:t>
-            </a:r>
-            <a:r>
-              <a:rPr lang="en-US" b="0" i="0" dirty="0" err="1">
-                <a:solidFill>
-                  <a:srgbClr val="222222"/>
-                </a:solidFill>
-                <a:effectLst/>
-                <a:latin typeface="Raleway"/>
-              </a:rPr>
-              <a:t>neque</a:t>
-            </a:r>
-            <a:r>
-              <a:rPr lang="en-US" b="0" i="0" dirty="0">
-                <a:solidFill>
-                  <a:srgbClr val="222222"/>
-                </a:solidFill>
-                <a:effectLst/>
-                <a:latin typeface="Raleway"/>
-              </a:rPr>
-              <a:t>. Non </a:t>
-            </a:r>
-            <a:r>
-              <a:rPr lang="en-US" b="0" i="0" dirty="0" err="1">
-                <a:solidFill>
-                  <a:srgbClr val="222222"/>
-                </a:solidFill>
-                <a:effectLst/>
-                <a:latin typeface="Raleway"/>
-              </a:rPr>
-              <a:t>ut</a:t>
-            </a:r>
-            <a:r>
-              <a:rPr lang="en-US" b="0" i="0" dirty="0">
-                <a:solidFill>
-                  <a:srgbClr val="222222"/>
-                </a:solidFill>
-                <a:effectLst/>
-                <a:latin typeface="Raleway"/>
-              </a:rPr>
-              <a:t> </a:t>
-            </a:r>
-            <a:r>
-              <a:rPr lang="en-US" b="0" i="0" dirty="0" err="1">
-                <a:solidFill>
-                  <a:srgbClr val="222222"/>
-                </a:solidFill>
-                <a:effectLst/>
-                <a:latin typeface="Raleway"/>
-              </a:rPr>
-              <a:t>consectetur</a:t>
-            </a:r>
-            <a:r>
-              <a:rPr lang="en-US" b="0" i="0" dirty="0">
-                <a:solidFill>
-                  <a:srgbClr val="222222"/>
-                </a:solidFill>
-                <a:effectLst/>
-                <a:latin typeface="Raleway"/>
-              </a:rPr>
-              <a:t> </a:t>
-            </a:r>
-            <a:r>
-              <a:rPr lang="en-US" b="0" i="0" dirty="0" err="1">
-                <a:solidFill>
-                  <a:srgbClr val="222222"/>
-                </a:solidFill>
-                <a:effectLst/>
-                <a:latin typeface="Raleway"/>
-              </a:rPr>
-              <a:t>etincidunt</a:t>
-            </a:r>
-            <a:r>
-              <a:rPr lang="en-US" b="0" i="0" dirty="0">
-                <a:solidFill>
-                  <a:srgbClr val="222222"/>
-                </a:solidFill>
-                <a:effectLst/>
-                <a:latin typeface="Raleway"/>
-              </a:rPr>
-              <a:t> non dolore </a:t>
-            </a:r>
-            <a:r>
-              <a:rPr lang="en-US" b="0" i="0" dirty="0" err="1">
-                <a:solidFill>
-                  <a:srgbClr val="222222"/>
-                </a:solidFill>
-                <a:effectLst/>
-                <a:latin typeface="Raleway"/>
-              </a:rPr>
-              <a:t>neque</a:t>
-            </a:r>
-            <a:r>
-              <a:rPr lang="en-US" b="0" i="0" dirty="0">
-                <a:solidFill>
-                  <a:srgbClr val="222222"/>
-                </a:solidFill>
-                <a:effectLst/>
-                <a:latin typeface="Raleway"/>
-              </a:rPr>
-              <a:t> </a:t>
-            </a:r>
-            <a:r>
-              <a:rPr lang="en-US" b="0" i="0" dirty="0" err="1">
-                <a:solidFill>
-                  <a:srgbClr val="222222"/>
-                </a:solidFill>
-                <a:effectLst/>
-                <a:latin typeface="Raleway"/>
-              </a:rPr>
-              <a:t>aliquam</a:t>
-            </a:r>
-            <a:r>
-              <a:rPr lang="en-US" b="0" i="0" dirty="0">
-                <a:solidFill>
-                  <a:srgbClr val="222222"/>
-                </a:solidFill>
-                <a:effectLst/>
-                <a:latin typeface="Raleway"/>
-              </a:rPr>
-              <a:t>.</a:t>
-            </a:r>
-            <a:endParaRPr lang="en-US" dirty="0"/>
-          </a:p>
-          <a:p>
-            <a:endParaRPr lang="en-US" dirty="0"/>
-          </a:p>
-        </p:txBody>
-      </p:sp>
-      <p:sp>
-        <p:nvSpPr>
-          <p:cNvPr id="5" name="Text Placeholder 4">
-            <a:extLst>
-              <a:ext uri="{FF2B5EF4-FFF2-40B4-BE49-F238E27FC236}">
-                <a16:creationId xmlns:a16="http://schemas.microsoft.com/office/drawing/2014/main" id="{7E723556-B2E9-4A49-A000-65C64ADE8154}"/>
-              </a:ext>
-            </a:extLst>
-          </p:cNvPr>
-          <p:cNvSpPr>
-            <a:spLocks noGrp="1"/>
-          </p:cNvSpPr>
-          <p:nvPr>
-            <p:ph type="body" sz="quarter" idx="20"/>
-          </p:nvPr>
-        </p:nvSpPr>
-        <p:spPr/>
-        <p:txBody>
-          <a:bodyPr>
-            <a:normAutofit/>
-          </a:bodyPr>
-          <a:lstStyle/>
-          <a:p>
-            <a:pPr marL="0" marR="0" lvl="0" indent="0" algn="l" defTabSz="457200" rtl="0" eaLnBrk="1" fontAlgn="auto" latinLnBrk="0" hangingPunct="1">
-              <a:lnSpc>
-                <a:spcPct val="100000"/>
-              </a:lnSpc>
-              <a:spcBef>
-                <a:spcPts val="0"/>
-              </a:spcBef>
-              <a:spcAft>
-                <a:spcPts val="0"/>
-              </a:spcAft>
-              <a:buClrTx/>
-              <a:buSzTx/>
-              <a:buFont typeface="Arial" panose="020B0604020202020204" pitchFamily="34" charset="0"/>
-              <a:buNone/>
-              <a:tabLst/>
-              <a:defRPr/>
-            </a:pPr>
-            <a:r>
-              <a:rPr kumimoji="0" lang="en-US" sz="800" b="1" i="0" u="none" strike="noStrike" kern="1200" cap="none" spc="0" normalizeH="0" baseline="0" noProof="0" dirty="0" err="1">
-                <a:ln>
-                  <a:noFill/>
-                </a:ln>
-                <a:solidFill>
-                  <a:srgbClr val="003399"/>
-                </a:solidFill>
-                <a:effectLst/>
-                <a:uLnTx/>
-                <a:uFillTx/>
-                <a:latin typeface="Raleway"/>
-                <a:ea typeface="+mn-ea"/>
-                <a:cs typeface="+mn-cs"/>
-              </a:rPr>
-              <a:t>Ultricies</a:t>
-            </a:r>
-            <a:r>
-              <a:rPr kumimoji="0" lang="en-US" sz="800" b="1" i="0" u="none" strike="noStrike" kern="1200" cap="none" spc="0" normalizeH="0" baseline="0" noProof="0" dirty="0">
-                <a:ln>
-                  <a:noFill/>
-                </a:ln>
-                <a:solidFill>
-                  <a:srgbClr val="003399"/>
-                </a:solidFill>
-                <a:effectLst/>
-                <a:uLnTx/>
-                <a:uFillTx/>
-                <a:latin typeface="Raleway"/>
-                <a:ea typeface="+mn-ea"/>
-                <a:cs typeface="+mn-cs"/>
-              </a:rPr>
-              <a:t> </a:t>
-            </a:r>
-            <a:r>
-              <a:rPr kumimoji="0" lang="en-US" sz="800" b="1" i="0" u="none" strike="noStrike" kern="1200" cap="none" spc="0" normalizeH="0" baseline="0" noProof="0" dirty="0" err="1">
-                <a:ln>
-                  <a:noFill/>
-                </a:ln>
-                <a:solidFill>
-                  <a:srgbClr val="003399"/>
-                </a:solidFill>
-                <a:effectLst/>
-                <a:uLnTx/>
-                <a:uFillTx/>
-                <a:latin typeface="Raleway"/>
-                <a:ea typeface="+mn-ea"/>
-                <a:cs typeface="+mn-cs"/>
-              </a:rPr>
-              <a:t>fusce</a:t>
-            </a:r>
-            <a:r>
-              <a:rPr kumimoji="0" lang="en-US" sz="800" b="1" i="0" u="none" strike="noStrike" kern="1200" cap="none" spc="0" normalizeH="0" baseline="0" noProof="0" dirty="0">
-                <a:ln>
-                  <a:noFill/>
-                </a:ln>
-                <a:solidFill>
-                  <a:srgbClr val="003399"/>
-                </a:solidFill>
-                <a:effectLst/>
-                <a:uLnTx/>
-                <a:uFillTx/>
-                <a:latin typeface="Raleway"/>
-                <a:ea typeface="+mn-ea"/>
-                <a:cs typeface="+mn-cs"/>
-              </a:rPr>
-              <a:t> vel, ad </a:t>
-            </a:r>
-            <a:r>
-              <a:rPr kumimoji="0" lang="en-US" sz="800" b="1" i="0" u="none" strike="noStrike" kern="1200" cap="none" spc="0" normalizeH="0" baseline="0" noProof="0" dirty="0" err="1">
-                <a:ln>
-                  <a:noFill/>
-                </a:ln>
-                <a:solidFill>
-                  <a:srgbClr val="003399"/>
-                </a:solidFill>
-                <a:effectLst/>
-                <a:uLnTx/>
-                <a:uFillTx/>
-                <a:latin typeface="Raleway"/>
-                <a:ea typeface="+mn-ea"/>
-                <a:cs typeface="+mn-cs"/>
-              </a:rPr>
-              <a:t>ultricies</a:t>
-            </a:r>
-            <a:r>
-              <a:rPr kumimoji="0" lang="en-US" sz="800" b="1" i="0" u="none" strike="noStrike" kern="1200" cap="none" spc="0" normalizeH="0" baseline="0" noProof="0" dirty="0">
-                <a:ln>
-                  <a:noFill/>
-                </a:ln>
-                <a:solidFill>
-                  <a:srgbClr val="003399"/>
-                </a:solidFill>
-                <a:effectLst/>
-                <a:uLnTx/>
-                <a:uFillTx/>
-                <a:latin typeface="Raleway"/>
-                <a:ea typeface="+mn-ea"/>
-                <a:cs typeface="+mn-cs"/>
-              </a:rPr>
-              <a:t> </a:t>
-            </a:r>
-            <a:r>
-              <a:rPr kumimoji="0" lang="en-US" sz="800" b="1" i="0" u="none" strike="noStrike" kern="1200" cap="none" spc="0" normalizeH="0" baseline="0" noProof="0" dirty="0" err="1">
-                <a:ln>
-                  <a:noFill/>
-                </a:ln>
-                <a:solidFill>
-                  <a:srgbClr val="003399"/>
-                </a:solidFill>
-                <a:effectLst/>
-                <a:uLnTx/>
-                <a:uFillTx/>
-                <a:latin typeface="Raleway"/>
-                <a:ea typeface="+mn-ea"/>
-                <a:cs typeface="+mn-cs"/>
-              </a:rPr>
-              <a:t>enim</a:t>
-            </a:r>
-            <a:r>
-              <a:rPr kumimoji="0" lang="en-US" sz="800" b="1" i="0" u="none" strike="noStrike" kern="1200" cap="none" spc="0" normalizeH="0" baseline="0" noProof="0" dirty="0">
-                <a:ln>
-                  <a:noFill/>
-                </a:ln>
-                <a:solidFill>
-                  <a:srgbClr val="003399"/>
-                </a:solidFill>
-                <a:effectLst/>
-                <a:uLnTx/>
-                <a:uFillTx/>
-                <a:latin typeface="Raleway"/>
-                <a:ea typeface="+mn-ea"/>
-                <a:cs typeface="+mn-cs"/>
-              </a:rPr>
-              <a:t>, at, </a:t>
-            </a:r>
-            <a:r>
-              <a:rPr kumimoji="0" lang="en-US" sz="800" b="1" i="0" u="none" strike="noStrike" kern="1200" cap="none" spc="0" normalizeH="0" baseline="0" noProof="0" dirty="0" err="1">
-                <a:ln>
-                  <a:noFill/>
-                </a:ln>
-                <a:solidFill>
-                  <a:srgbClr val="003399"/>
-                </a:solidFill>
-                <a:effectLst/>
-                <a:uLnTx/>
-                <a:uFillTx/>
-                <a:latin typeface="Raleway"/>
-                <a:ea typeface="+mn-ea"/>
-                <a:cs typeface="+mn-cs"/>
-              </a:rPr>
-              <a:t>egestas</a:t>
-            </a:r>
-            <a:br>
-              <a:rPr kumimoji="0" lang="en-US" sz="800" b="1" i="0" u="none" strike="noStrike" kern="1200" cap="none" spc="0" normalizeH="0" baseline="0" noProof="0" dirty="0">
-                <a:ln>
-                  <a:noFill/>
-                </a:ln>
-                <a:solidFill>
-                  <a:srgbClr val="003399"/>
-                </a:solidFill>
-                <a:effectLst/>
-                <a:uLnTx/>
-                <a:uFillTx/>
-                <a:latin typeface="Raleway"/>
-                <a:ea typeface="+mn-ea"/>
-                <a:cs typeface="+mn-cs"/>
-              </a:rPr>
-            </a:br>
-            <a:r>
-              <a:rPr kumimoji="0" lang="en-US" sz="800" b="0" i="0" u="none" strike="noStrike" kern="1200" cap="none" spc="0" normalizeH="0" baseline="0" noProof="0" dirty="0" err="1">
-                <a:ln>
-                  <a:noFill/>
-                </a:ln>
-                <a:solidFill>
-                  <a:srgbClr val="222222"/>
-                </a:solidFill>
-                <a:effectLst/>
-                <a:uLnTx/>
-                <a:uFillTx/>
-                <a:latin typeface="Raleway"/>
-                <a:ea typeface="+mn-ea"/>
-                <a:cs typeface="+mn-cs"/>
-              </a:rPr>
-              <a:t>Quis</a:t>
-            </a:r>
-            <a:r>
-              <a:rPr kumimoji="0" lang="en-US" sz="800" b="0" i="0" u="none" strike="noStrike" kern="1200" cap="none" spc="0" normalizeH="0" baseline="0" noProof="0" dirty="0">
-                <a:ln>
-                  <a:noFill/>
-                </a:ln>
-                <a:solidFill>
-                  <a:srgbClr val="222222"/>
-                </a:solidFill>
-                <a:effectLst/>
-                <a:uLnTx/>
-                <a:uFillTx/>
-                <a:latin typeface="Raleway"/>
-                <a:ea typeface="+mn-ea"/>
-                <a:cs typeface="+mn-cs"/>
-              </a:rPr>
-              <a:t> </a:t>
-            </a:r>
-            <a:r>
-              <a:rPr kumimoji="0" lang="en-US" sz="800" b="0" i="0" u="none" strike="noStrike" kern="1200" cap="none" spc="0" normalizeH="0" baseline="0" noProof="0" dirty="0" err="1">
-                <a:ln>
-                  <a:noFill/>
-                </a:ln>
-                <a:solidFill>
-                  <a:srgbClr val="222222"/>
-                </a:solidFill>
-                <a:effectLst/>
-                <a:uLnTx/>
-                <a:uFillTx/>
-                <a:latin typeface="Raleway"/>
-                <a:ea typeface="+mn-ea"/>
-                <a:cs typeface="+mn-cs"/>
-              </a:rPr>
-              <a:t>mauris</a:t>
-            </a:r>
-            <a:r>
-              <a:rPr kumimoji="0" lang="en-US" sz="800" b="0" i="0" u="none" strike="noStrike" kern="1200" cap="none" spc="0" normalizeH="0" baseline="0" noProof="0" dirty="0">
-                <a:ln>
-                  <a:noFill/>
-                </a:ln>
-                <a:solidFill>
-                  <a:srgbClr val="222222"/>
-                </a:solidFill>
-                <a:effectLst/>
-                <a:uLnTx/>
-                <a:uFillTx/>
-                <a:latin typeface="Raleway"/>
-                <a:ea typeface="+mn-ea"/>
-                <a:cs typeface="+mn-cs"/>
-              </a:rPr>
-              <a:t> dolor </a:t>
-            </a:r>
-            <a:r>
-              <a:rPr kumimoji="0" lang="en-US" sz="800" b="0" i="0" u="none" strike="noStrike" kern="1200" cap="none" spc="0" normalizeH="0" baseline="0" noProof="0" dirty="0" err="1">
-                <a:ln>
-                  <a:noFill/>
-                </a:ln>
-                <a:solidFill>
-                  <a:srgbClr val="222222"/>
-                </a:solidFill>
-                <a:effectLst/>
-                <a:uLnTx/>
-                <a:uFillTx/>
-                <a:latin typeface="Raleway"/>
-                <a:ea typeface="+mn-ea"/>
-                <a:cs typeface="+mn-cs"/>
-              </a:rPr>
-              <a:t>amet</a:t>
-            </a:r>
-            <a:r>
-              <a:rPr kumimoji="0" lang="en-US" sz="800" b="0" i="0" u="none" strike="noStrike" kern="1200" cap="none" spc="0" normalizeH="0" baseline="0" noProof="0" dirty="0">
-                <a:ln>
-                  <a:noFill/>
-                </a:ln>
-                <a:solidFill>
-                  <a:srgbClr val="222222"/>
-                </a:solidFill>
-                <a:effectLst/>
-                <a:uLnTx/>
-                <a:uFillTx/>
-                <a:latin typeface="Raleway"/>
-                <a:ea typeface="+mn-ea"/>
-                <a:cs typeface="+mn-cs"/>
-              </a:rPr>
-              <a:t> </a:t>
-            </a:r>
-            <a:r>
-              <a:rPr kumimoji="0" lang="en-US" sz="800" b="0" i="0" u="none" strike="noStrike" kern="1200" cap="none" spc="0" normalizeH="0" baseline="0" noProof="0" dirty="0" err="1">
-                <a:ln>
-                  <a:noFill/>
-                </a:ln>
-                <a:solidFill>
-                  <a:srgbClr val="222222"/>
-                </a:solidFill>
-                <a:effectLst/>
-                <a:uLnTx/>
-                <a:uFillTx/>
-                <a:latin typeface="Raleway"/>
-                <a:ea typeface="+mn-ea"/>
-                <a:cs typeface="+mn-cs"/>
-              </a:rPr>
-              <a:t>cubilia</a:t>
-            </a:r>
-            <a:r>
-              <a:rPr kumimoji="0" lang="en-US" sz="800" b="0" i="0" u="none" strike="noStrike" kern="1200" cap="none" spc="0" normalizeH="0" baseline="0" noProof="0" dirty="0">
-                <a:ln>
-                  <a:noFill/>
-                </a:ln>
-                <a:solidFill>
-                  <a:srgbClr val="222222"/>
-                </a:solidFill>
-                <a:effectLst/>
-                <a:uLnTx/>
-                <a:uFillTx/>
-                <a:latin typeface="Raleway"/>
-                <a:ea typeface="+mn-ea"/>
-                <a:cs typeface="+mn-cs"/>
-              </a:rPr>
-              <a:t> </a:t>
-            </a:r>
-            <a:r>
-              <a:rPr kumimoji="0" lang="en-US" sz="800" b="0" i="0" u="none" strike="noStrike" kern="1200" cap="none" spc="0" normalizeH="0" baseline="0" noProof="0" dirty="0" err="1">
-                <a:ln>
-                  <a:noFill/>
-                </a:ln>
-                <a:solidFill>
-                  <a:srgbClr val="222222"/>
-                </a:solidFill>
-                <a:effectLst/>
-                <a:uLnTx/>
-                <a:uFillTx/>
-                <a:latin typeface="Raleway"/>
-                <a:ea typeface="+mn-ea"/>
-                <a:cs typeface="+mn-cs"/>
-              </a:rPr>
-              <a:t>mattis</a:t>
-            </a:r>
-            <a:r>
-              <a:rPr kumimoji="0" lang="en-US" sz="800" b="0" i="0" u="none" strike="noStrike" kern="1200" cap="none" spc="0" normalizeH="0" baseline="0" noProof="0" dirty="0">
-                <a:ln>
-                  <a:noFill/>
-                </a:ln>
-                <a:solidFill>
-                  <a:srgbClr val="222222"/>
-                </a:solidFill>
-                <a:effectLst/>
-                <a:uLnTx/>
-                <a:uFillTx/>
-                <a:latin typeface="Raleway"/>
-                <a:ea typeface="+mn-ea"/>
-                <a:cs typeface="+mn-cs"/>
-              </a:rPr>
-              <a:t>, </a:t>
-            </a:r>
-            <a:r>
-              <a:rPr kumimoji="0" lang="en-US" sz="800" b="0" i="0" u="none" strike="noStrike" kern="1200" cap="none" spc="0" normalizeH="0" baseline="0" noProof="0" dirty="0" err="1">
-                <a:ln>
-                  <a:noFill/>
-                </a:ln>
-                <a:solidFill>
-                  <a:srgbClr val="222222"/>
-                </a:solidFill>
-                <a:effectLst/>
-                <a:uLnTx/>
-                <a:uFillTx/>
-                <a:latin typeface="Raleway"/>
-                <a:ea typeface="+mn-ea"/>
-                <a:cs typeface="+mn-cs"/>
-              </a:rPr>
-              <a:t>finibus</a:t>
-            </a:r>
-            <a:r>
-              <a:rPr kumimoji="0" lang="en-US" sz="800" b="0" i="0" u="none" strike="noStrike" kern="1200" cap="none" spc="0" normalizeH="0" baseline="0" noProof="0" dirty="0">
-                <a:ln>
-                  <a:noFill/>
-                </a:ln>
-                <a:solidFill>
-                  <a:srgbClr val="222222"/>
-                </a:solidFill>
-                <a:effectLst/>
-                <a:uLnTx/>
-                <a:uFillTx/>
-                <a:latin typeface="Raleway"/>
-                <a:ea typeface="+mn-ea"/>
-                <a:cs typeface="+mn-cs"/>
-              </a:rPr>
-              <a:t> </a:t>
-            </a:r>
-            <a:r>
-              <a:rPr kumimoji="0" lang="en-US" sz="800" b="0" i="0" u="none" strike="noStrike" kern="1200" cap="none" spc="0" normalizeH="0" baseline="0" noProof="0" dirty="0" err="1">
-                <a:ln>
-                  <a:noFill/>
-                </a:ln>
-                <a:solidFill>
-                  <a:srgbClr val="222222"/>
-                </a:solidFill>
-                <a:effectLst/>
-                <a:uLnTx/>
-                <a:uFillTx/>
-                <a:latin typeface="Raleway"/>
-                <a:ea typeface="+mn-ea"/>
-                <a:cs typeface="+mn-cs"/>
-              </a:rPr>
-              <a:t>magnis</a:t>
-            </a:r>
-            <a:r>
-              <a:rPr kumimoji="0" lang="en-US" sz="800" b="0" i="0" u="none" strike="noStrike" kern="1200" cap="none" spc="0" normalizeH="0" baseline="0" noProof="0" dirty="0">
-                <a:ln>
-                  <a:noFill/>
-                </a:ln>
-                <a:solidFill>
-                  <a:srgbClr val="222222"/>
-                </a:solidFill>
-                <a:effectLst/>
-                <a:uLnTx/>
-                <a:uFillTx/>
-                <a:latin typeface="Raleway"/>
-                <a:ea typeface="+mn-ea"/>
-                <a:cs typeface="+mn-cs"/>
-              </a:rPr>
-              <a:t> </a:t>
-            </a:r>
-            <a:r>
-              <a:rPr kumimoji="0" lang="en-US" sz="800" b="0" i="0" u="none" strike="noStrike" kern="1200" cap="none" spc="0" normalizeH="0" baseline="0" noProof="0" dirty="0" err="1">
-                <a:ln>
-                  <a:noFill/>
-                </a:ln>
-                <a:solidFill>
-                  <a:srgbClr val="222222"/>
-                </a:solidFill>
-                <a:effectLst/>
-                <a:uLnTx/>
-                <a:uFillTx/>
-                <a:latin typeface="Raleway"/>
-                <a:ea typeface="+mn-ea"/>
-                <a:cs typeface="+mn-cs"/>
-              </a:rPr>
-              <a:t>lacus</a:t>
-            </a:r>
-            <a:endParaRPr kumimoji="0" lang="en-US" sz="800" b="0" i="0" u="none" strike="noStrike" kern="1200" cap="none" spc="0" normalizeH="0" baseline="0" noProof="0" dirty="0">
-              <a:ln>
-                <a:noFill/>
-              </a:ln>
-              <a:solidFill>
-                <a:srgbClr val="222222"/>
-              </a:solidFill>
-              <a:effectLst/>
-              <a:uLnTx/>
-              <a:uFillTx/>
-              <a:latin typeface="Raleway"/>
-              <a:ea typeface="+mn-ea"/>
-              <a:cs typeface="+mn-cs"/>
-            </a:endParaRPr>
-          </a:p>
-        </p:txBody>
-      </p:sp>
-      <p:sp>
-        <p:nvSpPr>
-          <p:cNvPr id="6" name="Text Placeholder 5">
-            <a:extLst>
-              <a:ext uri="{FF2B5EF4-FFF2-40B4-BE49-F238E27FC236}">
-                <a16:creationId xmlns:a16="http://schemas.microsoft.com/office/drawing/2014/main" id="{9CA00018-F717-49BD-8A0B-5E7A4586472F}"/>
-              </a:ext>
-            </a:extLst>
-          </p:cNvPr>
-          <p:cNvSpPr>
-            <a:spLocks noGrp="1"/>
-          </p:cNvSpPr>
-          <p:nvPr>
-            <p:ph type="body" sz="quarter" idx="21"/>
-          </p:nvPr>
-        </p:nvSpPr>
-        <p:spPr/>
-        <p:txBody>
-          <a:bodyPr>
-            <a:normAutofit/>
-          </a:bodyPr>
-          <a:lstStyle/>
-          <a:p>
-            <a:pPr marL="0" marR="0" lvl="0" indent="0" algn="l" defTabSz="457200" rtl="0" eaLnBrk="1" fontAlgn="auto" latinLnBrk="0" hangingPunct="1">
-              <a:lnSpc>
-                <a:spcPct val="100000"/>
-              </a:lnSpc>
-              <a:spcBef>
-                <a:spcPts val="0"/>
-              </a:spcBef>
-              <a:spcAft>
-                <a:spcPts val="0"/>
-              </a:spcAft>
-              <a:buClrTx/>
-              <a:buSzTx/>
-              <a:buFont typeface="Arial" panose="020B0604020202020204" pitchFamily="34" charset="0"/>
-              <a:buNone/>
-              <a:tabLst/>
-              <a:defRPr/>
-            </a:pPr>
-            <a:r>
-              <a:rPr kumimoji="0" lang="en-US" sz="800" b="1" i="0" u="none" strike="noStrike" kern="1200" cap="none" spc="0" normalizeH="0" baseline="0" noProof="0" dirty="0" err="1">
-                <a:ln>
-                  <a:noFill/>
-                </a:ln>
-                <a:solidFill>
-                  <a:srgbClr val="003399"/>
-                </a:solidFill>
-                <a:effectLst/>
-                <a:uLnTx/>
-                <a:uFillTx/>
-                <a:latin typeface="Raleway"/>
-                <a:ea typeface="+mn-ea"/>
-                <a:cs typeface="+mn-cs"/>
-              </a:rPr>
-              <a:t>Ultricies</a:t>
-            </a:r>
-            <a:r>
-              <a:rPr kumimoji="0" lang="en-US" sz="800" b="1" i="0" u="none" strike="noStrike" kern="1200" cap="none" spc="0" normalizeH="0" baseline="0" noProof="0" dirty="0">
-                <a:ln>
-                  <a:noFill/>
-                </a:ln>
-                <a:solidFill>
-                  <a:srgbClr val="003399"/>
-                </a:solidFill>
-                <a:effectLst/>
-                <a:uLnTx/>
-                <a:uFillTx/>
-                <a:latin typeface="Raleway"/>
-                <a:ea typeface="+mn-ea"/>
-                <a:cs typeface="+mn-cs"/>
-              </a:rPr>
-              <a:t> </a:t>
-            </a:r>
-            <a:r>
-              <a:rPr kumimoji="0" lang="en-US" sz="800" b="1" i="0" u="none" strike="noStrike" kern="1200" cap="none" spc="0" normalizeH="0" baseline="0" noProof="0" dirty="0" err="1">
-                <a:ln>
-                  <a:noFill/>
-                </a:ln>
-                <a:solidFill>
-                  <a:srgbClr val="003399"/>
-                </a:solidFill>
-                <a:effectLst/>
-                <a:uLnTx/>
-                <a:uFillTx/>
-                <a:latin typeface="Raleway"/>
-                <a:ea typeface="+mn-ea"/>
-                <a:cs typeface="+mn-cs"/>
-              </a:rPr>
-              <a:t>fusce</a:t>
-            </a:r>
-            <a:r>
-              <a:rPr kumimoji="0" lang="en-US" sz="800" b="1" i="0" u="none" strike="noStrike" kern="1200" cap="none" spc="0" normalizeH="0" baseline="0" noProof="0" dirty="0">
-                <a:ln>
-                  <a:noFill/>
-                </a:ln>
-                <a:solidFill>
-                  <a:srgbClr val="003399"/>
-                </a:solidFill>
-                <a:effectLst/>
-                <a:uLnTx/>
-                <a:uFillTx/>
-                <a:latin typeface="Raleway"/>
-                <a:ea typeface="+mn-ea"/>
-                <a:cs typeface="+mn-cs"/>
-              </a:rPr>
-              <a:t> vel, ad </a:t>
-            </a:r>
-            <a:r>
-              <a:rPr kumimoji="0" lang="en-US" sz="800" b="1" i="0" u="none" strike="noStrike" kern="1200" cap="none" spc="0" normalizeH="0" baseline="0" noProof="0" dirty="0" err="1">
-                <a:ln>
-                  <a:noFill/>
-                </a:ln>
-                <a:solidFill>
-                  <a:srgbClr val="003399"/>
-                </a:solidFill>
-                <a:effectLst/>
-                <a:uLnTx/>
-                <a:uFillTx/>
-                <a:latin typeface="Raleway"/>
-                <a:ea typeface="+mn-ea"/>
-                <a:cs typeface="+mn-cs"/>
-              </a:rPr>
-              <a:t>ultricies</a:t>
-            </a:r>
-            <a:r>
-              <a:rPr kumimoji="0" lang="en-US" sz="800" b="1" i="0" u="none" strike="noStrike" kern="1200" cap="none" spc="0" normalizeH="0" baseline="0" noProof="0" dirty="0">
-                <a:ln>
-                  <a:noFill/>
-                </a:ln>
-                <a:solidFill>
-                  <a:srgbClr val="003399"/>
-                </a:solidFill>
-                <a:effectLst/>
-                <a:uLnTx/>
-                <a:uFillTx/>
-                <a:latin typeface="Raleway"/>
-                <a:ea typeface="+mn-ea"/>
-                <a:cs typeface="+mn-cs"/>
-              </a:rPr>
-              <a:t> </a:t>
-            </a:r>
-            <a:r>
-              <a:rPr kumimoji="0" lang="en-US" sz="800" b="1" i="0" u="none" strike="noStrike" kern="1200" cap="none" spc="0" normalizeH="0" baseline="0" noProof="0" dirty="0" err="1">
-                <a:ln>
-                  <a:noFill/>
-                </a:ln>
-                <a:solidFill>
-                  <a:srgbClr val="003399"/>
-                </a:solidFill>
-                <a:effectLst/>
-                <a:uLnTx/>
-                <a:uFillTx/>
-                <a:latin typeface="Raleway"/>
-                <a:ea typeface="+mn-ea"/>
-                <a:cs typeface="+mn-cs"/>
-              </a:rPr>
-              <a:t>enim</a:t>
-            </a:r>
-            <a:r>
-              <a:rPr kumimoji="0" lang="en-US" sz="800" b="1" i="0" u="none" strike="noStrike" kern="1200" cap="none" spc="0" normalizeH="0" baseline="0" noProof="0" dirty="0">
-                <a:ln>
-                  <a:noFill/>
-                </a:ln>
-                <a:solidFill>
-                  <a:srgbClr val="003399"/>
-                </a:solidFill>
-                <a:effectLst/>
-                <a:uLnTx/>
-                <a:uFillTx/>
-                <a:latin typeface="Raleway"/>
-                <a:ea typeface="+mn-ea"/>
-                <a:cs typeface="+mn-cs"/>
-              </a:rPr>
-              <a:t>, at, </a:t>
-            </a:r>
-            <a:r>
-              <a:rPr kumimoji="0" lang="en-US" sz="800" b="1" i="0" u="none" strike="noStrike" kern="1200" cap="none" spc="0" normalizeH="0" baseline="0" noProof="0" dirty="0" err="1">
-                <a:ln>
-                  <a:noFill/>
-                </a:ln>
-                <a:solidFill>
-                  <a:srgbClr val="003399"/>
-                </a:solidFill>
-                <a:effectLst/>
-                <a:uLnTx/>
-                <a:uFillTx/>
-                <a:latin typeface="Raleway"/>
-                <a:ea typeface="+mn-ea"/>
-                <a:cs typeface="+mn-cs"/>
-              </a:rPr>
-              <a:t>egestas</a:t>
-            </a:r>
-            <a:br>
-              <a:rPr kumimoji="0" lang="en-US" sz="800" b="1" i="0" u="none" strike="noStrike" kern="1200" cap="none" spc="0" normalizeH="0" baseline="0" noProof="0" dirty="0">
-                <a:ln>
-                  <a:noFill/>
-                </a:ln>
-                <a:solidFill>
-                  <a:srgbClr val="003399"/>
-                </a:solidFill>
-                <a:effectLst/>
-                <a:uLnTx/>
-                <a:uFillTx/>
-                <a:latin typeface="Raleway"/>
-                <a:ea typeface="+mn-ea"/>
-                <a:cs typeface="+mn-cs"/>
-              </a:rPr>
-            </a:br>
-            <a:r>
-              <a:rPr kumimoji="0" lang="en-US" sz="800" b="0" i="0" u="none" strike="noStrike" kern="1200" cap="none" spc="0" normalizeH="0" baseline="0" noProof="0" dirty="0" err="1">
-                <a:ln>
-                  <a:noFill/>
-                </a:ln>
-                <a:solidFill>
-                  <a:srgbClr val="222222"/>
-                </a:solidFill>
-                <a:effectLst/>
-                <a:uLnTx/>
-                <a:uFillTx/>
-                <a:latin typeface="Raleway"/>
-                <a:ea typeface="+mn-ea"/>
-                <a:cs typeface="+mn-cs"/>
-              </a:rPr>
-              <a:t>Quis</a:t>
-            </a:r>
-            <a:r>
-              <a:rPr kumimoji="0" lang="en-US" sz="800" b="0" i="0" u="none" strike="noStrike" kern="1200" cap="none" spc="0" normalizeH="0" baseline="0" noProof="0" dirty="0">
-                <a:ln>
-                  <a:noFill/>
-                </a:ln>
-                <a:solidFill>
-                  <a:srgbClr val="222222"/>
-                </a:solidFill>
-                <a:effectLst/>
-                <a:uLnTx/>
-                <a:uFillTx/>
-                <a:latin typeface="Raleway"/>
-                <a:ea typeface="+mn-ea"/>
-                <a:cs typeface="+mn-cs"/>
-              </a:rPr>
-              <a:t> </a:t>
-            </a:r>
-            <a:r>
-              <a:rPr kumimoji="0" lang="en-US" sz="800" b="0" i="0" u="none" strike="noStrike" kern="1200" cap="none" spc="0" normalizeH="0" baseline="0" noProof="0" dirty="0" err="1">
-                <a:ln>
-                  <a:noFill/>
-                </a:ln>
-                <a:solidFill>
-                  <a:srgbClr val="222222"/>
-                </a:solidFill>
-                <a:effectLst/>
-                <a:uLnTx/>
-                <a:uFillTx/>
-                <a:latin typeface="Raleway"/>
-                <a:ea typeface="+mn-ea"/>
-                <a:cs typeface="+mn-cs"/>
-              </a:rPr>
-              <a:t>mauris</a:t>
-            </a:r>
-            <a:r>
-              <a:rPr kumimoji="0" lang="en-US" sz="800" b="0" i="0" u="none" strike="noStrike" kern="1200" cap="none" spc="0" normalizeH="0" baseline="0" noProof="0" dirty="0">
-                <a:ln>
-                  <a:noFill/>
-                </a:ln>
-                <a:solidFill>
-                  <a:srgbClr val="222222"/>
-                </a:solidFill>
-                <a:effectLst/>
-                <a:uLnTx/>
-                <a:uFillTx/>
-                <a:latin typeface="Raleway"/>
-                <a:ea typeface="+mn-ea"/>
-                <a:cs typeface="+mn-cs"/>
-              </a:rPr>
-              <a:t> dolor </a:t>
-            </a:r>
-            <a:r>
-              <a:rPr kumimoji="0" lang="en-US" sz="800" b="0" i="0" u="none" strike="noStrike" kern="1200" cap="none" spc="0" normalizeH="0" baseline="0" noProof="0" dirty="0" err="1">
-                <a:ln>
-                  <a:noFill/>
-                </a:ln>
-                <a:solidFill>
-                  <a:srgbClr val="222222"/>
-                </a:solidFill>
-                <a:effectLst/>
-                <a:uLnTx/>
-                <a:uFillTx/>
-                <a:latin typeface="Raleway"/>
-                <a:ea typeface="+mn-ea"/>
-                <a:cs typeface="+mn-cs"/>
-              </a:rPr>
-              <a:t>amet</a:t>
-            </a:r>
-            <a:r>
-              <a:rPr kumimoji="0" lang="en-US" sz="800" b="0" i="0" u="none" strike="noStrike" kern="1200" cap="none" spc="0" normalizeH="0" baseline="0" noProof="0" dirty="0">
-                <a:ln>
-                  <a:noFill/>
-                </a:ln>
-                <a:solidFill>
-                  <a:srgbClr val="222222"/>
-                </a:solidFill>
-                <a:effectLst/>
-                <a:uLnTx/>
-                <a:uFillTx/>
-                <a:latin typeface="Raleway"/>
-                <a:ea typeface="+mn-ea"/>
-                <a:cs typeface="+mn-cs"/>
-              </a:rPr>
-              <a:t> </a:t>
-            </a:r>
-            <a:r>
-              <a:rPr kumimoji="0" lang="en-US" sz="800" b="0" i="0" u="none" strike="noStrike" kern="1200" cap="none" spc="0" normalizeH="0" baseline="0" noProof="0" dirty="0" err="1">
-                <a:ln>
-                  <a:noFill/>
-                </a:ln>
-                <a:solidFill>
-                  <a:srgbClr val="222222"/>
-                </a:solidFill>
-                <a:effectLst/>
-                <a:uLnTx/>
-                <a:uFillTx/>
-                <a:latin typeface="Raleway"/>
-                <a:ea typeface="+mn-ea"/>
-                <a:cs typeface="+mn-cs"/>
-              </a:rPr>
-              <a:t>cubilia</a:t>
-            </a:r>
-            <a:r>
-              <a:rPr kumimoji="0" lang="en-US" sz="800" b="0" i="0" u="none" strike="noStrike" kern="1200" cap="none" spc="0" normalizeH="0" baseline="0" noProof="0" dirty="0">
-                <a:ln>
-                  <a:noFill/>
-                </a:ln>
-                <a:solidFill>
-                  <a:srgbClr val="222222"/>
-                </a:solidFill>
-                <a:effectLst/>
-                <a:uLnTx/>
-                <a:uFillTx/>
-                <a:latin typeface="Raleway"/>
-                <a:ea typeface="+mn-ea"/>
-                <a:cs typeface="+mn-cs"/>
-              </a:rPr>
-              <a:t> </a:t>
-            </a:r>
-            <a:r>
-              <a:rPr kumimoji="0" lang="en-US" sz="800" b="0" i="0" u="none" strike="noStrike" kern="1200" cap="none" spc="0" normalizeH="0" baseline="0" noProof="0" dirty="0" err="1">
-                <a:ln>
-                  <a:noFill/>
-                </a:ln>
-                <a:solidFill>
-                  <a:srgbClr val="222222"/>
-                </a:solidFill>
-                <a:effectLst/>
-                <a:uLnTx/>
-                <a:uFillTx/>
-                <a:latin typeface="Raleway"/>
-                <a:ea typeface="+mn-ea"/>
-                <a:cs typeface="+mn-cs"/>
-              </a:rPr>
-              <a:t>mattis</a:t>
-            </a:r>
-            <a:r>
-              <a:rPr kumimoji="0" lang="en-US" sz="800" b="0" i="0" u="none" strike="noStrike" kern="1200" cap="none" spc="0" normalizeH="0" baseline="0" noProof="0" dirty="0">
-                <a:ln>
-                  <a:noFill/>
-                </a:ln>
-                <a:solidFill>
-                  <a:srgbClr val="222222"/>
-                </a:solidFill>
-                <a:effectLst/>
-                <a:uLnTx/>
-                <a:uFillTx/>
-                <a:latin typeface="Raleway"/>
-                <a:ea typeface="+mn-ea"/>
-                <a:cs typeface="+mn-cs"/>
-              </a:rPr>
-              <a:t>, </a:t>
-            </a:r>
-            <a:r>
-              <a:rPr kumimoji="0" lang="en-US" sz="800" b="0" i="0" u="none" strike="noStrike" kern="1200" cap="none" spc="0" normalizeH="0" baseline="0" noProof="0" dirty="0" err="1">
-                <a:ln>
-                  <a:noFill/>
-                </a:ln>
-                <a:solidFill>
-                  <a:srgbClr val="222222"/>
-                </a:solidFill>
-                <a:effectLst/>
-                <a:uLnTx/>
-                <a:uFillTx/>
-                <a:latin typeface="Raleway"/>
-                <a:ea typeface="+mn-ea"/>
-                <a:cs typeface="+mn-cs"/>
-              </a:rPr>
-              <a:t>finibus</a:t>
-            </a:r>
-            <a:r>
-              <a:rPr kumimoji="0" lang="en-US" sz="800" b="0" i="0" u="none" strike="noStrike" kern="1200" cap="none" spc="0" normalizeH="0" baseline="0" noProof="0" dirty="0">
-                <a:ln>
-                  <a:noFill/>
-                </a:ln>
-                <a:solidFill>
-                  <a:srgbClr val="222222"/>
-                </a:solidFill>
-                <a:effectLst/>
-                <a:uLnTx/>
-                <a:uFillTx/>
-                <a:latin typeface="Raleway"/>
-                <a:ea typeface="+mn-ea"/>
-                <a:cs typeface="+mn-cs"/>
-              </a:rPr>
-              <a:t> </a:t>
-            </a:r>
-            <a:r>
-              <a:rPr kumimoji="0" lang="en-US" sz="800" b="0" i="0" u="none" strike="noStrike" kern="1200" cap="none" spc="0" normalizeH="0" baseline="0" noProof="0" dirty="0" err="1">
-                <a:ln>
-                  <a:noFill/>
-                </a:ln>
-                <a:solidFill>
-                  <a:srgbClr val="222222"/>
-                </a:solidFill>
-                <a:effectLst/>
-                <a:uLnTx/>
-                <a:uFillTx/>
-                <a:latin typeface="Raleway"/>
-                <a:ea typeface="+mn-ea"/>
-                <a:cs typeface="+mn-cs"/>
-              </a:rPr>
-              <a:t>magnis</a:t>
-            </a:r>
-            <a:r>
-              <a:rPr kumimoji="0" lang="en-US" sz="800" b="0" i="0" u="none" strike="noStrike" kern="1200" cap="none" spc="0" normalizeH="0" baseline="0" noProof="0" dirty="0">
-                <a:ln>
-                  <a:noFill/>
-                </a:ln>
-                <a:solidFill>
-                  <a:srgbClr val="222222"/>
-                </a:solidFill>
-                <a:effectLst/>
-                <a:uLnTx/>
-                <a:uFillTx/>
-                <a:latin typeface="Raleway"/>
-                <a:ea typeface="+mn-ea"/>
-                <a:cs typeface="+mn-cs"/>
-              </a:rPr>
-              <a:t> </a:t>
-            </a:r>
-            <a:r>
-              <a:rPr kumimoji="0" lang="en-US" sz="800" b="0" i="0" u="none" strike="noStrike" kern="1200" cap="none" spc="0" normalizeH="0" baseline="0" noProof="0" dirty="0" err="1">
-                <a:ln>
-                  <a:noFill/>
-                </a:ln>
-                <a:solidFill>
-                  <a:srgbClr val="222222"/>
-                </a:solidFill>
-                <a:effectLst/>
-                <a:uLnTx/>
-                <a:uFillTx/>
-                <a:latin typeface="Raleway"/>
-                <a:ea typeface="+mn-ea"/>
-                <a:cs typeface="+mn-cs"/>
-              </a:rPr>
-              <a:t>lacus</a:t>
-            </a:r>
-            <a:endParaRPr kumimoji="0" lang="en-US" sz="800" b="0" i="0" u="none" strike="noStrike" kern="1200" cap="none" spc="0" normalizeH="0" baseline="0" noProof="0" dirty="0">
-              <a:ln>
-                <a:noFill/>
-              </a:ln>
-              <a:solidFill>
-                <a:srgbClr val="222222"/>
-              </a:solidFill>
-              <a:effectLst/>
-              <a:uLnTx/>
-              <a:uFillTx/>
-              <a:latin typeface="Raleway"/>
-              <a:ea typeface="+mn-ea"/>
-              <a:cs typeface="+mn-cs"/>
-            </a:endParaRPr>
-          </a:p>
-        </p:txBody>
-      </p:sp>
-      <p:sp>
-        <p:nvSpPr>
-          <p:cNvPr id="7" name="Text Placeholder 6">
-            <a:extLst>
-              <a:ext uri="{FF2B5EF4-FFF2-40B4-BE49-F238E27FC236}">
-                <a16:creationId xmlns:a16="http://schemas.microsoft.com/office/drawing/2014/main" id="{6B605BFD-3057-4F7A-B85A-D91A48E8E910}"/>
-              </a:ext>
-            </a:extLst>
-          </p:cNvPr>
-          <p:cNvSpPr>
-            <a:spLocks noGrp="1"/>
-          </p:cNvSpPr>
-          <p:nvPr>
-            <p:ph type="body" sz="quarter" idx="22"/>
-          </p:nvPr>
-        </p:nvSpPr>
-        <p:spPr/>
-        <p:txBody>
-          <a:bodyPr/>
-          <a:lstStyle/>
-          <a:p>
-            <a:endParaRPr lang="en-US"/>
-          </a:p>
-        </p:txBody>
-      </p:sp>
-      <p:sp>
-        <p:nvSpPr>
-          <p:cNvPr id="8" name="Text Placeholder 7">
-            <a:extLst>
-              <a:ext uri="{FF2B5EF4-FFF2-40B4-BE49-F238E27FC236}">
-                <a16:creationId xmlns:a16="http://schemas.microsoft.com/office/drawing/2014/main" id="{5C3DC0C8-ED22-4DBC-AA1E-46AB6E64A22B}"/>
-              </a:ext>
-            </a:extLst>
-          </p:cNvPr>
-          <p:cNvSpPr>
-            <a:spLocks noGrp="1"/>
-          </p:cNvSpPr>
-          <p:nvPr>
-            <p:ph type="body" sz="quarter" idx="13"/>
-          </p:nvPr>
-        </p:nvSpPr>
-        <p:spPr/>
-        <p:txBody>
-          <a:bodyPr>
-            <a:normAutofit fontScale="55000" lnSpcReduction="20000"/>
-          </a:bodyPr>
-          <a:lstStyle/>
-          <a:p>
-            <a:pPr marL="0" indent="0">
-              <a:buNone/>
-            </a:pPr>
-            <a:r>
-              <a:rPr lang="en-US" dirty="0">
-                <a:solidFill>
-                  <a:srgbClr val="222222"/>
-                </a:solidFill>
-                <a:latin typeface="Raleway"/>
-              </a:rPr>
-              <a:t>Sit </a:t>
-            </a:r>
-            <a:r>
-              <a:rPr lang="en-US" dirty="0" err="1">
-                <a:solidFill>
-                  <a:srgbClr val="222222"/>
-                </a:solidFill>
-                <a:latin typeface="Raleway"/>
-              </a:rPr>
-              <a:t>numquam</a:t>
-            </a:r>
-            <a:r>
-              <a:rPr lang="en-US" dirty="0">
-                <a:solidFill>
-                  <a:srgbClr val="222222"/>
-                </a:solidFill>
-                <a:latin typeface="Raleway"/>
-              </a:rPr>
-              <a:t> dolor </a:t>
-            </a:r>
-            <a:r>
-              <a:rPr lang="en-US" dirty="0" err="1">
-                <a:solidFill>
-                  <a:srgbClr val="222222"/>
-                </a:solidFill>
-                <a:latin typeface="Raleway"/>
-              </a:rPr>
-              <a:t>est</a:t>
-            </a:r>
-            <a:r>
-              <a:rPr lang="en-US" dirty="0">
-                <a:solidFill>
-                  <a:srgbClr val="222222"/>
-                </a:solidFill>
-                <a:latin typeface="Raleway"/>
-              </a:rPr>
-              <a:t> dolore </a:t>
-            </a:r>
-            <a:r>
-              <a:rPr lang="en-US" dirty="0" err="1">
-                <a:solidFill>
-                  <a:srgbClr val="222222"/>
-                </a:solidFill>
-                <a:latin typeface="Raleway"/>
-              </a:rPr>
-              <a:t>modi</a:t>
-            </a:r>
-            <a:r>
-              <a:rPr lang="en-US" dirty="0">
-                <a:solidFill>
-                  <a:srgbClr val="222222"/>
-                </a:solidFill>
-                <a:latin typeface="Raleway"/>
-              </a:rPr>
-              <a:t>. </a:t>
-            </a:r>
-            <a:r>
-              <a:rPr lang="en-US" dirty="0" err="1">
-                <a:solidFill>
-                  <a:srgbClr val="222222"/>
-                </a:solidFill>
-                <a:latin typeface="Raleway"/>
-              </a:rPr>
-              <a:t>Magnam</a:t>
-            </a:r>
-            <a:r>
-              <a:rPr lang="en-US" dirty="0">
-                <a:solidFill>
-                  <a:srgbClr val="222222"/>
-                </a:solidFill>
-                <a:latin typeface="Raleway"/>
-              </a:rPr>
-              <a:t> </a:t>
-            </a:r>
-            <a:r>
-              <a:rPr lang="en-US" dirty="0" err="1">
-                <a:solidFill>
-                  <a:srgbClr val="222222"/>
-                </a:solidFill>
-                <a:latin typeface="Raleway"/>
-              </a:rPr>
-              <a:t>porro</a:t>
-            </a:r>
-            <a:r>
-              <a:rPr lang="en-US" dirty="0">
-                <a:solidFill>
-                  <a:srgbClr val="222222"/>
-                </a:solidFill>
-                <a:latin typeface="Raleway"/>
-              </a:rPr>
-              <a:t> </a:t>
-            </a:r>
-            <a:r>
-              <a:rPr lang="en-US" dirty="0" err="1">
-                <a:solidFill>
-                  <a:srgbClr val="222222"/>
-                </a:solidFill>
-                <a:latin typeface="Raleway"/>
-              </a:rPr>
-              <a:t>modi</a:t>
-            </a:r>
-            <a:r>
-              <a:rPr lang="en-US" dirty="0">
-                <a:solidFill>
-                  <a:srgbClr val="222222"/>
-                </a:solidFill>
-                <a:latin typeface="Raleway"/>
-              </a:rPr>
-              <a:t> </a:t>
-            </a:r>
-            <a:r>
-              <a:rPr lang="en-US" dirty="0" err="1">
-                <a:solidFill>
-                  <a:srgbClr val="222222"/>
-                </a:solidFill>
-                <a:latin typeface="Raleway"/>
-              </a:rPr>
-              <a:t>etincidunt</a:t>
-            </a:r>
-            <a:r>
-              <a:rPr lang="en-US" dirty="0">
-                <a:solidFill>
-                  <a:srgbClr val="222222"/>
-                </a:solidFill>
-                <a:latin typeface="Raleway"/>
-              </a:rPr>
-              <a:t> </a:t>
-            </a:r>
-            <a:r>
-              <a:rPr lang="en-US" dirty="0" err="1">
-                <a:solidFill>
-                  <a:srgbClr val="222222"/>
-                </a:solidFill>
-                <a:latin typeface="Raleway"/>
-              </a:rPr>
-              <a:t>voluptatem</a:t>
-            </a:r>
-            <a:r>
-              <a:rPr lang="en-US" dirty="0">
-                <a:solidFill>
-                  <a:srgbClr val="222222"/>
-                </a:solidFill>
-                <a:latin typeface="Raleway"/>
-              </a:rPr>
-              <a:t> </a:t>
-            </a:r>
-            <a:r>
-              <a:rPr lang="en-US" dirty="0" err="1">
-                <a:solidFill>
-                  <a:srgbClr val="222222"/>
-                </a:solidFill>
-                <a:latin typeface="Raleway"/>
-              </a:rPr>
-              <a:t>tempora</a:t>
-            </a:r>
-            <a:r>
-              <a:rPr lang="en-US" dirty="0">
-                <a:solidFill>
-                  <a:srgbClr val="222222"/>
-                </a:solidFill>
-                <a:latin typeface="Raleway"/>
-              </a:rPr>
-              <a:t>. Ut </a:t>
-            </a:r>
-            <a:r>
-              <a:rPr lang="en-US" dirty="0" err="1">
-                <a:solidFill>
-                  <a:srgbClr val="222222"/>
-                </a:solidFill>
-                <a:latin typeface="Raleway"/>
-              </a:rPr>
-              <a:t>consectetur</a:t>
-            </a:r>
-            <a:r>
-              <a:rPr lang="en-US" dirty="0">
-                <a:solidFill>
-                  <a:srgbClr val="222222"/>
-                </a:solidFill>
-                <a:latin typeface="Raleway"/>
-              </a:rPr>
-              <a:t> </a:t>
-            </a:r>
-            <a:r>
-              <a:rPr lang="en-US" dirty="0" err="1">
-                <a:solidFill>
-                  <a:srgbClr val="222222"/>
-                </a:solidFill>
-                <a:latin typeface="Raleway"/>
-              </a:rPr>
-              <a:t>voluptatem</a:t>
-            </a:r>
-            <a:r>
-              <a:rPr lang="en-US" dirty="0">
-                <a:solidFill>
-                  <a:srgbClr val="222222"/>
-                </a:solidFill>
-                <a:latin typeface="Raleway"/>
-              </a:rPr>
-              <a:t> dolore </a:t>
-            </a:r>
-            <a:r>
-              <a:rPr lang="en-US" dirty="0" err="1">
-                <a:solidFill>
-                  <a:srgbClr val="222222"/>
-                </a:solidFill>
-                <a:latin typeface="Raleway"/>
-              </a:rPr>
-              <a:t>quiquia</a:t>
-            </a:r>
-            <a:r>
-              <a:rPr lang="en-US" dirty="0">
-                <a:solidFill>
-                  <a:srgbClr val="222222"/>
-                </a:solidFill>
-                <a:latin typeface="Raleway"/>
-              </a:rPr>
-              <a:t>. </a:t>
-            </a:r>
-            <a:r>
-              <a:rPr lang="en-US" dirty="0" err="1">
-                <a:solidFill>
-                  <a:srgbClr val="222222"/>
-                </a:solidFill>
-                <a:latin typeface="Raleway"/>
-              </a:rPr>
-              <a:t>Voluptatem</a:t>
-            </a:r>
-            <a:r>
-              <a:rPr lang="en-US" dirty="0">
-                <a:solidFill>
-                  <a:srgbClr val="222222"/>
-                </a:solidFill>
-                <a:latin typeface="Raleway"/>
-              </a:rPr>
-              <a:t> </a:t>
-            </a:r>
-            <a:r>
-              <a:rPr lang="en-US" dirty="0" err="1">
-                <a:solidFill>
-                  <a:srgbClr val="222222"/>
-                </a:solidFill>
-                <a:latin typeface="Raleway"/>
-              </a:rPr>
-              <a:t>quaerat</a:t>
-            </a:r>
-            <a:r>
-              <a:rPr lang="en-US" dirty="0">
-                <a:solidFill>
-                  <a:srgbClr val="222222"/>
-                </a:solidFill>
-                <a:latin typeface="Raleway"/>
-              </a:rPr>
-              <a:t> </a:t>
-            </a:r>
-            <a:r>
-              <a:rPr lang="en-US" dirty="0" err="1">
-                <a:solidFill>
-                  <a:srgbClr val="222222"/>
-                </a:solidFill>
-                <a:latin typeface="Raleway"/>
-              </a:rPr>
-              <a:t>numquam</a:t>
-            </a:r>
-            <a:r>
-              <a:rPr lang="en-US" dirty="0">
-                <a:solidFill>
-                  <a:srgbClr val="222222"/>
-                </a:solidFill>
-                <a:latin typeface="Raleway"/>
-              </a:rPr>
-              <a:t> </a:t>
-            </a:r>
-            <a:r>
-              <a:rPr lang="en-US" dirty="0" err="1">
-                <a:solidFill>
-                  <a:srgbClr val="222222"/>
-                </a:solidFill>
-                <a:latin typeface="Raleway"/>
-              </a:rPr>
-              <a:t>modi</a:t>
-            </a:r>
-            <a:r>
-              <a:rPr lang="en-US" dirty="0">
-                <a:solidFill>
-                  <a:srgbClr val="222222"/>
-                </a:solidFill>
-                <a:latin typeface="Raleway"/>
-              </a:rPr>
-              <a:t> sit dolore </a:t>
-            </a:r>
-            <a:r>
-              <a:rPr lang="en-US" dirty="0" err="1">
-                <a:solidFill>
-                  <a:srgbClr val="222222"/>
-                </a:solidFill>
-                <a:latin typeface="Raleway"/>
-              </a:rPr>
-              <a:t>neque</a:t>
-            </a:r>
-            <a:r>
-              <a:rPr lang="en-US" dirty="0">
-                <a:solidFill>
-                  <a:srgbClr val="222222"/>
-                </a:solidFill>
-                <a:latin typeface="Raleway"/>
-              </a:rPr>
-              <a:t>. Non </a:t>
-            </a:r>
-            <a:r>
-              <a:rPr lang="en-US" dirty="0" err="1">
-                <a:solidFill>
-                  <a:srgbClr val="222222"/>
-                </a:solidFill>
-                <a:latin typeface="Raleway"/>
-              </a:rPr>
-              <a:t>ut</a:t>
-            </a:r>
-            <a:r>
-              <a:rPr lang="en-US" dirty="0">
-                <a:solidFill>
-                  <a:srgbClr val="222222"/>
-                </a:solidFill>
-                <a:latin typeface="Raleway"/>
-              </a:rPr>
-              <a:t> </a:t>
-            </a:r>
-            <a:r>
-              <a:rPr lang="en-US" dirty="0" err="1">
-                <a:solidFill>
-                  <a:srgbClr val="222222"/>
-                </a:solidFill>
-                <a:latin typeface="Raleway"/>
-              </a:rPr>
-              <a:t>consectetur</a:t>
-            </a:r>
-            <a:r>
-              <a:rPr lang="en-US" dirty="0">
-                <a:solidFill>
-                  <a:srgbClr val="222222"/>
-                </a:solidFill>
-                <a:latin typeface="Raleway"/>
-              </a:rPr>
-              <a:t> </a:t>
-            </a:r>
-            <a:r>
-              <a:rPr lang="en-US" dirty="0" err="1">
-                <a:solidFill>
-                  <a:srgbClr val="222222"/>
-                </a:solidFill>
-                <a:latin typeface="Raleway"/>
-              </a:rPr>
-              <a:t>etincidunt</a:t>
-            </a:r>
-            <a:r>
-              <a:rPr lang="en-US" dirty="0">
-                <a:solidFill>
-                  <a:srgbClr val="222222"/>
-                </a:solidFill>
-                <a:latin typeface="Raleway"/>
-              </a:rPr>
-              <a:t> non dolore </a:t>
-            </a:r>
-            <a:r>
-              <a:rPr lang="en-US" dirty="0" err="1">
-                <a:solidFill>
-                  <a:srgbClr val="222222"/>
-                </a:solidFill>
-                <a:latin typeface="Raleway"/>
-              </a:rPr>
-              <a:t>neque</a:t>
-            </a:r>
-            <a:r>
-              <a:rPr lang="en-US" dirty="0">
-                <a:solidFill>
-                  <a:srgbClr val="222222"/>
-                </a:solidFill>
-                <a:latin typeface="Raleway"/>
-              </a:rPr>
-              <a:t> </a:t>
-            </a:r>
-            <a:r>
-              <a:rPr lang="en-US" dirty="0" err="1">
-                <a:solidFill>
-                  <a:srgbClr val="222222"/>
-                </a:solidFill>
-                <a:latin typeface="Raleway"/>
-              </a:rPr>
-              <a:t>aliquam</a:t>
-            </a:r>
-            <a:r>
-              <a:rPr lang="en-US" dirty="0">
-                <a:solidFill>
-                  <a:srgbClr val="222222"/>
-                </a:solidFill>
-                <a:latin typeface="Raleway"/>
-              </a:rPr>
-              <a:t>. Non </a:t>
-            </a:r>
-            <a:r>
-              <a:rPr lang="en-US" dirty="0" err="1">
-                <a:solidFill>
-                  <a:srgbClr val="222222"/>
-                </a:solidFill>
-                <a:latin typeface="Raleway"/>
-              </a:rPr>
-              <a:t>velit</a:t>
-            </a:r>
-            <a:r>
-              <a:rPr lang="en-US" dirty="0">
-                <a:solidFill>
-                  <a:srgbClr val="222222"/>
-                </a:solidFill>
-                <a:latin typeface="Raleway"/>
-              </a:rPr>
-              <a:t> </a:t>
-            </a:r>
-            <a:r>
-              <a:rPr lang="en-US" dirty="0" err="1">
-                <a:solidFill>
-                  <a:srgbClr val="222222"/>
-                </a:solidFill>
-                <a:latin typeface="Raleway"/>
-              </a:rPr>
-              <a:t>velit</a:t>
-            </a:r>
-            <a:r>
-              <a:rPr lang="en-US" dirty="0">
-                <a:solidFill>
-                  <a:srgbClr val="222222"/>
-                </a:solidFill>
-                <a:latin typeface="Raleway"/>
-              </a:rPr>
-              <a:t> </a:t>
-            </a:r>
-            <a:r>
-              <a:rPr lang="en-US" dirty="0" err="1">
-                <a:solidFill>
-                  <a:srgbClr val="222222"/>
-                </a:solidFill>
-                <a:latin typeface="Raleway"/>
-              </a:rPr>
-              <a:t>voluptatem</a:t>
-            </a:r>
-            <a:r>
-              <a:rPr lang="en-US" dirty="0">
-                <a:solidFill>
-                  <a:srgbClr val="222222"/>
-                </a:solidFill>
-                <a:latin typeface="Raleway"/>
-              </a:rPr>
-              <a:t> </a:t>
-            </a:r>
-            <a:r>
-              <a:rPr lang="en-US" dirty="0" err="1">
-                <a:solidFill>
-                  <a:srgbClr val="222222"/>
-                </a:solidFill>
-                <a:latin typeface="Raleway"/>
-              </a:rPr>
-              <a:t>dolorem</a:t>
-            </a:r>
-            <a:r>
-              <a:rPr lang="en-US" dirty="0">
-                <a:solidFill>
-                  <a:srgbClr val="222222"/>
-                </a:solidFill>
-                <a:latin typeface="Raleway"/>
-              </a:rPr>
-              <a:t> </a:t>
-            </a:r>
-            <a:r>
-              <a:rPr lang="en-US" dirty="0" err="1">
-                <a:solidFill>
-                  <a:srgbClr val="222222"/>
-                </a:solidFill>
-                <a:latin typeface="Raleway"/>
-              </a:rPr>
-              <a:t>consectetur</a:t>
-            </a:r>
-            <a:r>
-              <a:rPr lang="en-US" dirty="0">
-                <a:solidFill>
-                  <a:srgbClr val="222222"/>
-                </a:solidFill>
-                <a:latin typeface="Raleway"/>
-              </a:rPr>
-              <a:t> </a:t>
-            </a:r>
-            <a:r>
-              <a:rPr lang="en-US" dirty="0" err="1">
-                <a:solidFill>
-                  <a:srgbClr val="222222"/>
-                </a:solidFill>
-                <a:latin typeface="Raleway"/>
-              </a:rPr>
-              <a:t>amet</a:t>
-            </a:r>
-            <a:r>
-              <a:rPr lang="en-US" dirty="0">
-                <a:solidFill>
-                  <a:srgbClr val="222222"/>
-                </a:solidFill>
-                <a:latin typeface="Raleway"/>
-              </a:rPr>
-              <a:t> </a:t>
-            </a:r>
-            <a:r>
-              <a:rPr lang="en-US" dirty="0" err="1">
-                <a:solidFill>
-                  <a:srgbClr val="222222"/>
-                </a:solidFill>
-                <a:latin typeface="Raleway"/>
-              </a:rPr>
-              <a:t>modi</a:t>
-            </a:r>
-            <a:r>
-              <a:rPr lang="en-US" dirty="0">
-                <a:solidFill>
-                  <a:srgbClr val="222222"/>
-                </a:solidFill>
-                <a:latin typeface="Raleway"/>
-              </a:rPr>
-              <a:t>. </a:t>
-            </a:r>
-            <a:endParaRPr lang="en-US" dirty="0"/>
-          </a:p>
-        </p:txBody>
-      </p:sp>
-      <p:pic>
-        <p:nvPicPr>
-          <p:cNvPr id="9" name="Picture Placeholder 22">
-            <a:extLst>
-              <a:ext uri="{FF2B5EF4-FFF2-40B4-BE49-F238E27FC236}">
-                <a16:creationId xmlns:a16="http://schemas.microsoft.com/office/drawing/2014/main" id="{3E0F6E27-4027-4015-8A6A-08AA67FD54AA}"/>
-              </a:ext>
-            </a:extLst>
-          </p:cNvPr>
-          <p:cNvPicPr>
-            <a:picLocks noGrp="1" noChangeAspect="1"/>
-          </p:cNvPicPr>
-          <p:nvPr>
-            <p:ph type="pic" sz="quarter" idx="18"/>
-          </p:nvPr>
-        </p:nvPicPr>
-        <p:blipFill>
-          <a:blip r:embed="rId2">
-            <a:extLst>
-              <a:ext uri="{28A0092B-C50C-407E-A947-70E740481C1C}">
-                <a14:useLocalDpi xmlns:a14="http://schemas.microsoft.com/office/drawing/2010/main" val="0"/>
-              </a:ext>
-            </a:extLst>
-          </a:blip>
-          <a:srcRect t="5008" b="5008"/>
-          <a:stretch>
-            <a:fillRect/>
-          </a:stretch>
-        </p:blipFill>
-        <p:spPr>
-          <a:xfrm>
-            <a:off x="503238" y="4183063"/>
-            <a:ext cx="3154362" cy="2128837"/>
-          </a:xfrm>
-        </p:spPr>
-      </p:pic>
-      <p:pic>
-        <p:nvPicPr>
-          <p:cNvPr id="10" name="Picture Placeholder 20">
-            <a:extLst>
-              <a:ext uri="{FF2B5EF4-FFF2-40B4-BE49-F238E27FC236}">
-                <a16:creationId xmlns:a16="http://schemas.microsoft.com/office/drawing/2014/main" id="{0DDBF4D4-09F7-4736-BB65-9E1E754F2174}"/>
-              </a:ext>
-            </a:extLst>
-          </p:cNvPr>
-          <p:cNvPicPr>
-            <a:picLocks noGrp="1" noChangeAspect="1"/>
-          </p:cNvPicPr>
-          <p:nvPr>
-            <p:ph type="pic" sz="quarter" idx="19"/>
-          </p:nvPr>
-        </p:nvPicPr>
-        <p:blipFill>
-          <a:blip r:embed="rId3">
-            <a:extLst>
-              <a:ext uri="{28A0092B-C50C-407E-A947-70E740481C1C}">
-                <a14:useLocalDpi xmlns:a14="http://schemas.microsoft.com/office/drawing/2010/main" val="0"/>
-              </a:ext>
-            </a:extLst>
-          </a:blip>
-          <a:srcRect t="5008" b="5008"/>
-          <a:stretch>
-            <a:fillRect/>
-          </a:stretch>
-        </p:blipFill>
-        <p:spPr>
-          <a:xfrm>
-            <a:off x="3827463" y="4183063"/>
-            <a:ext cx="3154362" cy="2128837"/>
-          </a:xfrm>
-        </p:spPr>
-      </p:pic>
-      <p:pic>
-        <p:nvPicPr>
-          <p:cNvPr id="11" name="Picture Placeholder 11">
-            <a:extLst>
-              <a:ext uri="{FF2B5EF4-FFF2-40B4-BE49-F238E27FC236}">
-                <a16:creationId xmlns:a16="http://schemas.microsoft.com/office/drawing/2014/main" id="{638ED7F2-1CC6-44E0-91C5-4CC74589A272}"/>
-              </a:ext>
-            </a:extLst>
-          </p:cNvPr>
-          <p:cNvPicPr>
-            <a:picLocks noChangeAspect="1"/>
-          </p:cNvPicPr>
-          <p:nvPr/>
-        </p:nvPicPr>
-        <p:blipFill rotWithShape="1">
-          <a:blip r:embed="rId4"/>
-          <a:srcRect l="85" r="85"/>
-          <a:stretch/>
-        </p:blipFill>
-        <p:spPr>
-          <a:xfrm>
-            <a:off x="502919" y="7784193"/>
-            <a:ext cx="3154362" cy="1530797"/>
-          </a:xfrm>
-          <a:prstGeom prst="rect">
-            <a:avLst/>
-          </a:prstGeom>
-        </p:spPr>
-      </p:pic>
-      <p:pic>
-        <p:nvPicPr>
-          <p:cNvPr id="12" name="Picture Placeholder 13">
-            <a:extLst>
-              <a:ext uri="{FF2B5EF4-FFF2-40B4-BE49-F238E27FC236}">
-                <a16:creationId xmlns:a16="http://schemas.microsoft.com/office/drawing/2014/main" id="{31FD18BB-4AEF-4F48-AADE-D4A5458D7008}"/>
-              </a:ext>
-            </a:extLst>
-          </p:cNvPr>
-          <p:cNvPicPr>
-            <a:picLocks noChangeAspect="1"/>
-          </p:cNvPicPr>
-          <p:nvPr/>
-        </p:nvPicPr>
-        <p:blipFill rotWithShape="1">
-          <a:blip r:embed="rId4"/>
-          <a:srcRect l="85" r="85"/>
-          <a:stretch/>
-        </p:blipFill>
-        <p:spPr>
-          <a:xfrm>
-            <a:off x="3826782" y="7784193"/>
-            <a:ext cx="3154362" cy="1530797"/>
-          </a:xfrm>
-          <a:prstGeom prst="rect">
-            <a:avLst/>
-          </a:prstGeom>
-        </p:spPr>
-      </p:pic>
-    </p:spTree>
-    <p:extLst>
-      <p:ext uri="{BB962C8B-B14F-4D97-AF65-F5344CB8AC3E}">
-        <p14:creationId xmlns:p14="http://schemas.microsoft.com/office/powerpoint/2010/main" val="2524108995"/>
-      </p:ext>
-    </p:extLst>
-  </p:cSld>
-  <p:clrMapOvr>
-    <a:masterClrMapping/>
-  </p:clrMapOvr>
-</p:sld>
-</file>
-
-<file path=ppt/slides/slide4.xml><?xml version="1.0" encoding="utf-8"?>
-<p:sld xmlns:a="http://schemas.openxmlformats.org/drawingml/2006/main" xmlns:r="http://schemas.openxmlformats.org/officeDocument/2006/relationships" xmlns:p="http://schemas.openxmlformats.org/presentationml/2006/main">
-  <p:cSld>
-    <p:spTree>
-      <p:nvGrpSpPr>
-        <p:cNvPr id="1" name=""/>
-        <p:cNvGrpSpPr/>
-        <p:nvPr/>
-      </p:nvGrpSpPr>
-      <p:grpSpPr>
-        <a:xfrm>
-          <a:off x="0" y="0"/>
-          <a:ext cx="0" cy="0"/>
-          <a:chOff x="0" y="0"/>
-          <a:chExt cx="0" cy="0"/>
-        </a:xfrm>
-      </p:grpSpPr>
-      <p:sp>
-        <p:nvSpPr>
-          <p:cNvPr id="9" name="Text Placeholder 8">
-            <a:extLst>
-              <a:ext uri="{FF2B5EF4-FFF2-40B4-BE49-F238E27FC236}">
-                <a16:creationId xmlns:a16="http://schemas.microsoft.com/office/drawing/2014/main" id="{279A0408-8D99-49EF-82EB-FD63B201030A}"/>
-              </a:ext>
-            </a:extLst>
-          </p:cNvPr>
-          <p:cNvSpPr>
-            <a:spLocks noGrp="1"/>
-          </p:cNvSpPr>
-          <p:nvPr>
-            <p:ph type="body" sz="quarter" idx="13"/>
-          </p:nvPr>
-        </p:nvSpPr>
-        <p:spPr/>
-        <p:txBody>
-          <a:bodyPr/>
-          <a:lstStyle/>
-          <a:p>
-            <a:endParaRPr lang="en-US"/>
-          </a:p>
-        </p:txBody>
-      </p:sp>
-    </p:spTree>
-    <p:extLst>
-      <p:ext uri="{BB962C8B-B14F-4D97-AF65-F5344CB8AC3E}">
-        <p14:creationId xmlns:p14="http://schemas.microsoft.com/office/powerpoint/2010/main" val="1379016598"/>
-      </p:ext>
-    </p:extLst>
-  </p:cSld>
-  <p:clrMapOvr>
-    <a:masterClrMapping/>
-  </p:clrMapOvr>
-</p:sld>
-</file>
-
-<file path=ppt/slides/slide5.xml><?xml version="1.0" encoding="utf-8"?>
-<p:sld xmlns:a="http://schemas.openxmlformats.org/drawingml/2006/main" xmlns:r="http://schemas.openxmlformats.org/officeDocument/2006/relationships" xmlns:p="http://schemas.openxmlformats.org/presentationml/2006/main">
-  <p:cSld>
-    <p:spTree>
-      <p:nvGrpSpPr>
-        <p:cNvPr id="1" name=""/>
-        <p:cNvGrpSpPr/>
-        <p:nvPr/>
-      </p:nvGrpSpPr>
-      <p:grpSpPr>
-        <a:xfrm>
-          <a:off x="0" y="0"/>
-          <a:ext cx="0" cy="0"/>
-          <a:chOff x="0" y="0"/>
-          <a:chExt cx="0" cy="0"/>
-        </a:xfrm>
-      </p:grpSpPr>
-    </p:spTree>
-    <p:extLst>
-      <p:ext uri="{BB962C8B-B14F-4D97-AF65-F5344CB8AC3E}">
-        <p14:creationId xmlns:p14="http://schemas.microsoft.com/office/powerpoint/2010/main" val="2991619355"/>
-      </p:ext>
-    </p:extLst>
-  </p:cSld>
-  <p:clrMapOvr>
-    <a:masterClrMapping/>
-  </p:clrMapOvr>
-</p:sld>
-</file>
-
 <file path=ppt/theme/theme1.xml><?xml version="1.0" encoding="utf-8"?>
 <a:theme xmlns:a="http://schemas.openxmlformats.org/drawingml/2006/main" name="Office Theme">
   <a:themeElements>

</xml_diff>